<commit_message>
les outils de la recherche scientifique
Co-Authored-By: DRISS_ABATOUR <153183643+DRISS-57@users.noreply.github.com>
Co-Authored-By: NOUR EDDIN GAJJA <127679647+bytegajja@users.noreply.github.com>
</commit_message>
<xml_diff>
--- a/SEMESTER 1/Modélisation avec Python/G- Fichiers/Manipulation des Fichiers.pptx
+++ b/SEMESTER 1/Modélisation avec Python/G- Fichiers/Manipulation des Fichiers.pptx
@@ -280,7 +280,18 @@
   </p:defaultTextStyle>
   <p:extLst>
     <p:ext uri="{EFAFB233-063F-42B5-8137-9DF3F51BA10A}">
-      <p15:sldGuideLst xmlns:p15="http://schemas.microsoft.com/office/powerpoint/2012/main"/>
+      <p15:sldGuideLst xmlns:p15="http://schemas.microsoft.com/office/powerpoint/2012/main">
+        <p15:guide id="1" orient="horz" pos="1620">
+          <p15:clr>
+            <a:srgbClr val="A4A3A4"/>
+          </p15:clr>
+        </p15:guide>
+        <p15:guide id="2" pos="2880">
+          <p15:clr>
+            <a:srgbClr val="A4A3A4"/>
+          </p15:clr>
+        </p15:guide>
+      </p15:sldGuideLst>
     </p:ext>
   </p:extLst>
 </p:presentation>
@@ -341,7 +352,7 @@
             </a:lvl1pPr>
           </a:lstStyle>
           <a:p>
-            <a:endParaRPr lang="fr-FR"/>
+            <a:endParaRPr lang="fr-FR" dirty="0"/>
           </a:p>
         </p:txBody>
       </p:sp>
@@ -380,9 +391,9 @@
           <a:p>
             <a:fld id="{7D945005-0982-49FD-A400-988823CD1C0A}" type="datetimeFigureOut">
               <a:rPr lang="fr-FR" smtClean="0"/>
-              <a:t>12/01/2024</a:t>
+              <a:t>13/01/2024</a:t>
             </a:fld>
-            <a:endParaRPr lang="fr-FR"/>
+            <a:endParaRPr lang="fr-FR" dirty="0"/>
           </a:p>
         </p:txBody>
       </p:sp>
@@ -419,7 +430,7 @@
             </a:lvl1pPr>
           </a:lstStyle>
           <a:p>
-            <a:endParaRPr lang="fr-FR"/>
+            <a:endParaRPr lang="fr-FR" dirty="0"/>
           </a:p>
         </p:txBody>
       </p:sp>
@@ -460,7 +471,7 @@
               <a:rPr lang="fr-FR" smtClean="0"/>
               <a:t>‹N°›</a:t>
             </a:fld>
-            <a:endParaRPr lang="fr-FR"/>
+            <a:endParaRPr lang="fr-FR" dirty="0"/>
           </a:p>
         </p:txBody>
       </p:sp>
@@ -683,6 +694,11 @@
         </p:txBody>
       </p:sp>
     </p:spTree>
+    <p:extLst>
+      <p:ext uri="{BB962C8B-B14F-4D97-AF65-F5344CB8AC3E}">
+        <p14:creationId xmlns:p14="http://schemas.microsoft.com/office/powerpoint/2010/main" val="3939317084"/>
+      </p:ext>
+    </p:extLst>
   </p:cSld>
   <p:clrMap bg1="lt1" tx1="dk1" bg2="dk2" tx2="lt2" accent1="accent1" accent2="accent2" accent3="accent3" accent4="accent4" accent5="accent5" accent6="accent6" hlink="hlink" folHlink="folHlink"/>
   <p:hf hdr="0" ftr="0" dt="0"/>
@@ -1010,7 +1026,7 @@
               </a:spcAft>
               <a:buNone/>
             </a:pPr>
-            <a:endParaRPr/>
+            <a:endParaRPr dirty="0"/>
           </a:p>
         </p:txBody>
       </p:sp>
@@ -1114,7 +1130,7 @@
               </a:spcAft>
               <a:buNone/>
             </a:pPr>
-            <a:endParaRPr/>
+            <a:endParaRPr dirty="0"/>
           </a:p>
         </p:txBody>
       </p:sp>
@@ -1218,7 +1234,7 @@
               </a:spcAft>
               <a:buNone/>
             </a:pPr>
-            <a:endParaRPr/>
+            <a:endParaRPr dirty="0"/>
           </a:p>
         </p:txBody>
       </p:sp>
@@ -1327,7 +1343,7 @@
               </a:spcAft>
               <a:buNone/>
             </a:pPr>
-            <a:endParaRPr/>
+            <a:endParaRPr dirty="0"/>
           </a:p>
         </p:txBody>
       </p:sp>
@@ -1436,7 +1452,7 @@
               </a:spcAft>
               <a:buNone/>
             </a:pPr>
-            <a:endParaRPr/>
+            <a:endParaRPr dirty="0"/>
           </a:p>
         </p:txBody>
       </p:sp>
@@ -1545,7 +1561,7 @@
               </a:spcAft>
               <a:buNone/>
             </a:pPr>
-            <a:endParaRPr/>
+            <a:endParaRPr dirty="0"/>
           </a:p>
         </p:txBody>
       </p:sp>
@@ -1654,7 +1670,7 @@
               </a:spcAft>
               <a:buNone/>
             </a:pPr>
-            <a:endParaRPr/>
+            <a:endParaRPr dirty="0"/>
           </a:p>
         </p:txBody>
       </p:sp>
@@ -1763,7 +1779,7 @@
               </a:spcAft>
               <a:buNone/>
             </a:pPr>
-            <a:endParaRPr/>
+            <a:endParaRPr dirty="0"/>
           </a:p>
         </p:txBody>
       </p:sp>
@@ -1872,7 +1888,7 @@
               </a:spcAft>
               <a:buNone/>
             </a:pPr>
-            <a:endParaRPr/>
+            <a:endParaRPr dirty="0"/>
           </a:p>
         </p:txBody>
       </p:sp>
@@ -1981,7 +1997,7 @@
               </a:spcAft>
               <a:buNone/>
             </a:pPr>
-            <a:endParaRPr/>
+            <a:endParaRPr dirty="0"/>
           </a:p>
         </p:txBody>
       </p:sp>
@@ -2090,7 +2106,7 @@
               </a:spcAft>
               <a:buNone/>
             </a:pPr>
-            <a:endParaRPr/>
+            <a:endParaRPr dirty="0"/>
           </a:p>
         </p:txBody>
       </p:sp>
@@ -2199,7 +2215,7 @@
               </a:spcAft>
               <a:buNone/>
             </a:pPr>
-            <a:endParaRPr/>
+            <a:endParaRPr dirty="0"/>
           </a:p>
         </p:txBody>
       </p:sp>
@@ -2303,7 +2319,7 @@
               </a:spcAft>
               <a:buNone/>
             </a:pPr>
-            <a:endParaRPr/>
+            <a:endParaRPr dirty="0"/>
           </a:p>
         </p:txBody>
       </p:sp>
@@ -2412,7 +2428,7 @@
               </a:spcAft>
               <a:buNone/>
             </a:pPr>
-            <a:endParaRPr/>
+            <a:endParaRPr dirty="0"/>
           </a:p>
         </p:txBody>
       </p:sp>
@@ -2521,7 +2537,7 @@
               </a:spcAft>
               <a:buNone/>
             </a:pPr>
-            <a:endParaRPr/>
+            <a:endParaRPr dirty="0"/>
           </a:p>
         </p:txBody>
       </p:sp>
@@ -2630,7 +2646,7 @@
               </a:spcAft>
               <a:buNone/>
             </a:pPr>
-            <a:endParaRPr/>
+            <a:endParaRPr dirty="0"/>
           </a:p>
         </p:txBody>
       </p:sp>
@@ -2739,7 +2755,7 @@
               </a:spcAft>
               <a:buNone/>
             </a:pPr>
-            <a:endParaRPr/>
+            <a:endParaRPr dirty="0"/>
           </a:p>
         </p:txBody>
       </p:sp>
@@ -2848,7 +2864,7 @@
               </a:spcAft>
               <a:buNone/>
             </a:pPr>
-            <a:endParaRPr/>
+            <a:endParaRPr dirty="0"/>
           </a:p>
         </p:txBody>
       </p:sp>
@@ -2957,7 +2973,7 @@
               </a:spcAft>
               <a:buNone/>
             </a:pPr>
-            <a:endParaRPr/>
+            <a:endParaRPr dirty="0"/>
           </a:p>
         </p:txBody>
       </p:sp>
@@ -3066,7 +3082,7 @@
               </a:spcAft>
               <a:buNone/>
             </a:pPr>
-            <a:endParaRPr/>
+            <a:endParaRPr dirty="0"/>
           </a:p>
         </p:txBody>
       </p:sp>
@@ -3175,7 +3191,7 @@
               </a:spcAft>
               <a:buNone/>
             </a:pPr>
-            <a:endParaRPr/>
+            <a:endParaRPr dirty="0"/>
           </a:p>
         </p:txBody>
       </p:sp>
@@ -3284,7 +3300,7 @@
               </a:spcAft>
               <a:buNone/>
             </a:pPr>
-            <a:endParaRPr/>
+            <a:endParaRPr dirty="0"/>
           </a:p>
         </p:txBody>
       </p:sp>
@@ -3393,7 +3409,7 @@
               </a:spcAft>
               <a:buNone/>
             </a:pPr>
-            <a:endParaRPr/>
+            <a:endParaRPr dirty="0"/>
           </a:p>
         </p:txBody>
       </p:sp>
@@ -3497,7 +3513,7 @@
               </a:spcAft>
               <a:buNone/>
             </a:pPr>
-            <a:endParaRPr/>
+            <a:endParaRPr dirty="0"/>
           </a:p>
         </p:txBody>
       </p:sp>
@@ -3606,7 +3622,7 @@
               </a:spcAft>
               <a:buNone/>
             </a:pPr>
-            <a:endParaRPr/>
+            <a:endParaRPr dirty="0"/>
           </a:p>
         </p:txBody>
       </p:sp>
@@ -3715,7 +3731,7 @@
               </a:spcAft>
               <a:buNone/>
             </a:pPr>
-            <a:endParaRPr/>
+            <a:endParaRPr dirty="0"/>
           </a:p>
         </p:txBody>
       </p:sp>
@@ -3824,7 +3840,7 @@
               </a:spcAft>
               <a:buNone/>
             </a:pPr>
-            <a:endParaRPr/>
+            <a:endParaRPr dirty="0"/>
           </a:p>
         </p:txBody>
       </p:sp>
@@ -3933,7 +3949,7 @@
               </a:spcAft>
               <a:buNone/>
             </a:pPr>
-            <a:endParaRPr/>
+            <a:endParaRPr dirty="0"/>
           </a:p>
         </p:txBody>
       </p:sp>
@@ -4042,7 +4058,7 @@
               </a:spcAft>
               <a:buNone/>
             </a:pPr>
-            <a:endParaRPr/>
+            <a:endParaRPr dirty="0"/>
           </a:p>
         </p:txBody>
       </p:sp>
@@ -4146,7 +4162,7 @@
               </a:spcAft>
               <a:buNone/>
             </a:pPr>
-            <a:endParaRPr/>
+            <a:endParaRPr dirty="0"/>
           </a:p>
         </p:txBody>
       </p:sp>
@@ -4250,7 +4266,7 @@
               </a:spcAft>
               <a:buNone/>
             </a:pPr>
-            <a:endParaRPr/>
+            <a:endParaRPr dirty="0"/>
           </a:p>
         </p:txBody>
       </p:sp>
@@ -4354,7 +4370,7 @@
               </a:spcAft>
               <a:buNone/>
             </a:pPr>
-            <a:endParaRPr/>
+            <a:endParaRPr dirty="0"/>
           </a:p>
         </p:txBody>
       </p:sp>
@@ -4463,7 +4479,7 @@
               </a:spcAft>
               <a:buNone/>
             </a:pPr>
-            <a:endParaRPr/>
+            <a:endParaRPr dirty="0"/>
           </a:p>
         </p:txBody>
       </p:sp>
@@ -4572,7 +4588,7 @@
               </a:spcAft>
               <a:buNone/>
             </a:pPr>
-            <a:endParaRPr/>
+            <a:endParaRPr dirty="0"/>
           </a:p>
         </p:txBody>
       </p:sp>
@@ -4681,7 +4697,7 @@
               </a:spcAft>
               <a:buNone/>
             </a:pPr>
-            <a:endParaRPr/>
+            <a:endParaRPr dirty="0"/>
           </a:p>
         </p:txBody>
       </p:sp>
@@ -4788,7 +4804,7 @@
                 </a:spcAft>
                 <a:buNone/>
               </a:pPr>
-              <a:endParaRPr/>
+              <a:endParaRPr dirty="0"/>
             </a:p>
           </p:txBody>
         </p:sp>
@@ -4841,7 +4857,7 @@
                 </a:spcAft>
                 <a:buNone/>
               </a:pPr>
-              <a:endParaRPr/>
+              <a:endParaRPr dirty="0"/>
             </a:p>
           </p:txBody>
         </p:sp>
@@ -4911,7 +4927,7 @@
                 </a:spcAft>
                 <a:buNone/>
               </a:pPr>
-              <a:endParaRPr/>
+              <a:endParaRPr dirty="0"/>
             </a:p>
           </p:txBody>
         </p:sp>
@@ -4964,7 +4980,7 @@
                 </a:spcAft>
                 <a:buNone/>
               </a:pPr>
-              <a:endParaRPr/>
+              <a:endParaRPr dirty="0"/>
             </a:p>
           </p:txBody>
         </p:sp>
@@ -5032,7 +5048,7 @@
                 </a:spcAft>
                 <a:buNone/>
               </a:pPr>
-              <a:endParaRPr/>
+              <a:endParaRPr dirty="0"/>
             </a:p>
           </p:txBody>
         </p:sp>
@@ -5123,7 +5139,7 @@
                   </a:spcAft>
                   <a:buNone/>
                 </a:pPr>
-                <a:endParaRPr/>
+                <a:endParaRPr dirty="0"/>
               </a:p>
             </p:txBody>
           </p:sp>
@@ -5174,7 +5190,7 @@
                   </a:spcAft>
                   <a:buNone/>
                 </a:pPr>
-                <a:endParaRPr/>
+                <a:endParaRPr dirty="0"/>
               </a:p>
             </p:txBody>
           </p:sp>
@@ -5225,7 +5241,7 @@
                   </a:spcAft>
                   <a:buNone/>
                 </a:pPr>
-                <a:endParaRPr/>
+                <a:endParaRPr dirty="0"/>
               </a:p>
             </p:txBody>
           </p:sp>
@@ -5647,7 +5663,7 @@
                 </a:spcAft>
                 <a:buNone/>
               </a:pPr>
-              <a:endParaRPr/>
+              <a:endParaRPr dirty="0"/>
             </a:p>
           </p:txBody>
         </p:sp>
@@ -5700,7 +5716,7 @@
                 </a:spcAft>
                 <a:buNone/>
               </a:pPr>
-              <a:endParaRPr/>
+              <a:endParaRPr dirty="0"/>
             </a:p>
           </p:txBody>
         </p:sp>
@@ -5770,7 +5786,7 @@
                 </a:spcAft>
                 <a:buNone/>
               </a:pPr>
-              <a:endParaRPr/>
+              <a:endParaRPr dirty="0"/>
             </a:p>
           </p:txBody>
         </p:sp>
@@ -5823,7 +5839,7 @@
                 </a:spcAft>
                 <a:buNone/>
               </a:pPr>
-              <a:endParaRPr/>
+              <a:endParaRPr dirty="0"/>
             </a:p>
           </p:txBody>
         </p:sp>
@@ -5916,7 +5932,7 @@
                 </a:spcAft>
                 <a:buNone/>
               </a:pPr>
-              <a:endParaRPr/>
+              <a:endParaRPr dirty="0"/>
             </a:p>
           </p:txBody>
         </p:sp>
@@ -6007,7 +6023,7 @@
                   </a:spcAft>
                   <a:buNone/>
                 </a:pPr>
-                <a:endParaRPr/>
+                <a:endParaRPr dirty="0"/>
               </a:p>
             </p:txBody>
           </p:sp>
@@ -6058,7 +6074,7 @@
                   </a:spcAft>
                   <a:buNone/>
                 </a:pPr>
-                <a:endParaRPr/>
+                <a:endParaRPr dirty="0"/>
               </a:p>
             </p:txBody>
           </p:sp>
@@ -6109,7 +6125,7 @@
                   </a:spcAft>
                   <a:buNone/>
                 </a:pPr>
-                <a:endParaRPr/>
+                <a:endParaRPr dirty="0"/>
               </a:p>
             </p:txBody>
           </p:sp>
@@ -6213,7 +6229,7 @@
                 </a:spcAft>
                 <a:buNone/>
               </a:pPr>
-              <a:endParaRPr/>
+              <a:endParaRPr dirty="0"/>
             </a:p>
           </p:txBody>
         </p:sp>
@@ -6266,7 +6282,7 @@
                 </a:spcAft>
                 <a:buNone/>
               </a:pPr>
-              <a:endParaRPr/>
+              <a:endParaRPr dirty="0"/>
             </a:p>
           </p:txBody>
         </p:sp>
@@ -6336,7 +6352,7 @@
                 </a:spcAft>
                 <a:buNone/>
               </a:pPr>
-              <a:endParaRPr/>
+              <a:endParaRPr dirty="0"/>
             </a:p>
           </p:txBody>
         </p:sp>
@@ -6389,7 +6405,7 @@
                 </a:spcAft>
                 <a:buNone/>
               </a:pPr>
-              <a:endParaRPr/>
+              <a:endParaRPr dirty="0"/>
             </a:p>
           </p:txBody>
         </p:sp>
@@ -6457,7 +6473,7 @@
                 </a:spcAft>
                 <a:buNone/>
               </a:pPr>
-              <a:endParaRPr/>
+              <a:endParaRPr dirty="0"/>
             </a:p>
           </p:txBody>
         </p:sp>
@@ -6548,7 +6564,7 @@
                   </a:spcAft>
                   <a:buNone/>
                 </a:pPr>
-                <a:endParaRPr/>
+                <a:endParaRPr dirty="0"/>
               </a:p>
             </p:txBody>
           </p:sp>
@@ -6599,7 +6615,7 @@
                   </a:spcAft>
                   <a:buNone/>
                 </a:pPr>
-                <a:endParaRPr/>
+                <a:endParaRPr dirty="0"/>
               </a:p>
             </p:txBody>
           </p:sp>
@@ -6650,7 +6666,7 @@
                   </a:spcAft>
                   <a:buNone/>
                 </a:pPr>
-                <a:endParaRPr/>
+                <a:endParaRPr dirty="0"/>
               </a:p>
             </p:txBody>
           </p:sp>
@@ -6721,7 +6737,7 @@
                 </a:spcAft>
                 <a:buNone/>
               </a:pPr>
-              <a:endParaRPr/>
+              <a:endParaRPr dirty="0"/>
             </a:p>
           </p:txBody>
         </p:sp>
@@ -6774,7 +6790,7 @@
                 </a:spcAft>
                 <a:buNone/>
               </a:pPr>
-              <a:endParaRPr/>
+              <a:endParaRPr dirty="0"/>
             </a:p>
           </p:txBody>
         </p:sp>
@@ -6844,7 +6860,7 @@
                 </a:spcAft>
                 <a:buNone/>
               </a:pPr>
-              <a:endParaRPr/>
+              <a:endParaRPr dirty="0"/>
             </a:p>
           </p:txBody>
         </p:sp>
@@ -6897,7 +6913,7 @@
                 </a:spcAft>
                 <a:buNone/>
               </a:pPr>
-              <a:endParaRPr/>
+              <a:endParaRPr dirty="0"/>
             </a:p>
           </p:txBody>
         </p:sp>
@@ -6990,7 +7006,7 @@
                 </a:spcAft>
                 <a:buNone/>
               </a:pPr>
-              <a:endParaRPr/>
+              <a:endParaRPr dirty="0"/>
             </a:p>
           </p:txBody>
         </p:sp>
@@ -7081,7 +7097,7 @@
                   </a:spcAft>
                   <a:buNone/>
                 </a:pPr>
-                <a:endParaRPr/>
+                <a:endParaRPr dirty="0"/>
               </a:p>
             </p:txBody>
           </p:sp>
@@ -7132,7 +7148,7 @@
                   </a:spcAft>
                   <a:buNone/>
                 </a:pPr>
-                <a:endParaRPr/>
+                <a:endParaRPr dirty="0"/>
               </a:p>
             </p:txBody>
           </p:sp>
@@ -7183,7 +7199,7 @@
                   </a:spcAft>
                   <a:buNone/>
                 </a:pPr>
-                <a:endParaRPr/>
+                <a:endParaRPr dirty="0"/>
               </a:p>
             </p:txBody>
           </p:sp>
@@ -7254,7 +7270,7 @@
                 </a:spcAft>
                 <a:buNone/>
               </a:pPr>
-              <a:endParaRPr/>
+              <a:endParaRPr dirty="0"/>
             </a:p>
           </p:txBody>
         </p:sp>
@@ -7307,7 +7323,7 @@
                 </a:spcAft>
                 <a:buNone/>
               </a:pPr>
-              <a:endParaRPr/>
+              <a:endParaRPr dirty="0"/>
             </a:p>
           </p:txBody>
         </p:sp>
@@ -7793,7 +7809,7 @@
                 </a:spcAft>
                 <a:buNone/>
               </a:pPr>
-              <a:endParaRPr/>
+              <a:endParaRPr dirty="0"/>
             </a:p>
           </p:txBody>
         </p:sp>
@@ -7846,7 +7862,7 @@
                 </a:spcAft>
                 <a:buNone/>
               </a:pPr>
-              <a:endParaRPr/>
+              <a:endParaRPr dirty="0"/>
             </a:p>
           </p:txBody>
         </p:sp>
@@ -7939,7 +7955,7 @@
                 </a:spcAft>
                 <a:buNone/>
               </a:pPr>
-              <a:endParaRPr/>
+              <a:endParaRPr dirty="0"/>
             </a:p>
           </p:txBody>
         </p:sp>
@@ -8030,7 +8046,7 @@
                   </a:spcAft>
                   <a:buNone/>
                 </a:pPr>
-                <a:endParaRPr/>
+                <a:endParaRPr dirty="0"/>
               </a:p>
             </p:txBody>
           </p:sp>
@@ -8081,7 +8097,7 @@
                   </a:spcAft>
                   <a:buNone/>
                 </a:pPr>
-                <a:endParaRPr/>
+                <a:endParaRPr dirty="0"/>
               </a:p>
             </p:txBody>
           </p:sp>
@@ -8132,7 +8148,7 @@
                   </a:spcAft>
                   <a:buNone/>
                 </a:pPr>
-                <a:endParaRPr/>
+                <a:endParaRPr dirty="0"/>
               </a:p>
             </p:txBody>
           </p:sp>
@@ -8585,7 +8601,7 @@
                 </a:spcAft>
                 <a:buNone/>
               </a:pPr>
-              <a:endParaRPr/>
+              <a:endParaRPr dirty="0"/>
             </a:p>
           </p:txBody>
         </p:sp>
@@ -8638,7 +8654,7 @@
                 </a:spcAft>
                 <a:buNone/>
               </a:pPr>
-              <a:endParaRPr/>
+              <a:endParaRPr dirty="0"/>
             </a:p>
           </p:txBody>
         </p:sp>
@@ -8708,7 +8724,7 @@
                 </a:spcAft>
                 <a:buNone/>
               </a:pPr>
-              <a:endParaRPr/>
+              <a:endParaRPr dirty="0"/>
             </a:p>
           </p:txBody>
         </p:sp>
@@ -8761,7 +8777,7 @@
                 </a:spcAft>
                 <a:buNone/>
               </a:pPr>
-              <a:endParaRPr/>
+              <a:endParaRPr dirty="0"/>
             </a:p>
           </p:txBody>
         </p:sp>
@@ -8829,7 +8845,7 @@
                 </a:spcAft>
                 <a:buNone/>
               </a:pPr>
-              <a:endParaRPr/>
+              <a:endParaRPr dirty="0"/>
             </a:p>
           </p:txBody>
         </p:sp>
@@ -8920,7 +8936,7 @@
                   </a:spcAft>
                   <a:buNone/>
                 </a:pPr>
-                <a:endParaRPr/>
+                <a:endParaRPr dirty="0"/>
               </a:p>
             </p:txBody>
           </p:sp>
@@ -8971,7 +8987,7 @@
                   </a:spcAft>
                   <a:buNone/>
                 </a:pPr>
-                <a:endParaRPr/>
+                <a:endParaRPr dirty="0"/>
               </a:p>
             </p:txBody>
           </p:sp>
@@ -9022,7 +9038,7 @@
                   </a:spcAft>
                   <a:buNone/>
                 </a:pPr>
-                <a:endParaRPr/>
+                <a:endParaRPr dirty="0"/>
               </a:p>
             </p:txBody>
           </p:sp>
@@ -9093,7 +9109,7 @@
                 </a:spcAft>
                 <a:buNone/>
               </a:pPr>
-              <a:endParaRPr/>
+              <a:endParaRPr dirty="0"/>
             </a:p>
           </p:txBody>
         </p:sp>
@@ -9146,7 +9162,7 @@
                 </a:spcAft>
                 <a:buNone/>
               </a:pPr>
-              <a:endParaRPr/>
+              <a:endParaRPr dirty="0"/>
             </a:p>
           </p:txBody>
         </p:sp>
@@ -9504,7 +9520,7 @@
                 </a:spcAft>
                 <a:buNone/>
               </a:pPr>
-              <a:endParaRPr/>
+              <a:endParaRPr dirty="0"/>
             </a:p>
           </p:txBody>
         </p:sp>
@@ -9557,7 +9573,7 @@
                 </a:spcAft>
                 <a:buNone/>
               </a:pPr>
-              <a:endParaRPr/>
+              <a:endParaRPr dirty="0"/>
             </a:p>
           </p:txBody>
         </p:sp>
@@ -9683,7 +9699,7 @@
                 </a:spcAft>
                 <a:buNone/>
               </a:pPr>
-              <a:endParaRPr/>
+              <a:endParaRPr dirty="0"/>
             </a:p>
           </p:txBody>
         </p:sp>
@@ -9774,7 +9790,7 @@
                   </a:spcAft>
                   <a:buNone/>
                 </a:pPr>
-                <a:endParaRPr/>
+                <a:endParaRPr dirty="0"/>
               </a:p>
             </p:txBody>
           </p:sp>
@@ -9825,7 +9841,7 @@
                   </a:spcAft>
                   <a:buNone/>
                 </a:pPr>
-                <a:endParaRPr/>
+                <a:endParaRPr dirty="0"/>
               </a:p>
             </p:txBody>
           </p:sp>
@@ -9876,7 +9892,7 @@
                   </a:spcAft>
                   <a:buNone/>
                 </a:pPr>
-                <a:endParaRPr/>
+                <a:endParaRPr dirty="0"/>
               </a:p>
             </p:txBody>
           </p:sp>
@@ -11611,7 +11627,7 @@
                 </a:spcAft>
                 <a:buNone/>
               </a:pPr>
-              <a:endParaRPr/>
+              <a:endParaRPr dirty="0"/>
             </a:p>
           </p:txBody>
         </p:sp>
@@ -11664,7 +11680,7 @@
                 </a:spcAft>
                 <a:buNone/>
               </a:pPr>
-              <a:endParaRPr/>
+              <a:endParaRPr dirty="0"/>
             </a:p>
           </p:txBody>
         </p:sp>
@@ -11734,7 +11750,7 @@
                 </a:spcAft>
                 <a:buNone/>
               </a:pPr>
-              <a:endParaRPr/>
+              <a:endParaRPr dirty="0"/>
             </a:p>
           </p:txBody>
         </p:sp>
@@ -11787,7 +11803,7 @@
                 </a:spcAft>
                 <a:buNone/>
               </a:pPr>
-              <a:endParaRPr/>
+              <a:endParaRPr dirty="0"/>
             </a:p>
           </p:txBody>
         </p:sp>
@@ -12009,7 +12025,7 @@
                 </a:spcAft>
                 <a:buNone/>
               </a:pPr>
-              <a:endParaRPr/>
+              <a:endParaRPr dirty="0"/>
             </a:p>
           </p:txBody>
         </p:sp>
@@ -12100,7 +12116,7 @@
                   </a:spcAft>
                   <a:buNone/>
                 </a:pPr>
-                <a:endParaRPr/>
+                <a:endParaRPr dirty="0"/>
               </a:p>
             </p:txBody>
           </p:sp>
@@ -12151,7 +12167,7 @@
                   </a:spcAft>
                   <a:buNone/>
                 </a:pPr>
-                <a:endParaRPr/>
+                <a:endParaRPr dirty="0"/>
               </a:p>
             </p:txBody>
           </p:sp>
@@ -12202,7 +12218,7 @@
                   </a:spcAft>
                   <a:buNone/>
                 </a:pPr>
-                <a:endParaRPr/>
+                <a:endParaRPr dirty="0"/>
               </a:p>
             </p:txBody>
           </p:sp>
@@ -12558,7 +12574,7 @@
                 </a:spcAft>
                 <a:buNone/>
               </a:pPr>
-              <a:endParaRPr/>
+              <a:endParaRPr dirty="0"/>
             </a:p>
           </p:txBody>
         </p:sp>
@@ -12611,7 +12627,7 @@
                 </a:spcAft>
                 <a:buNone/>
               </a:pPr>
-              <a:endParaRPr/>
+              <a:endParaRPr dirty="0"/>
             </a:p>
           </p:txBody>
         </p:sp>
@@ -12681,7 +12697,7 @@
                 </a:spcAft>
                 <a:buNone/>
               </a:pPr>
-              <a:endParaRPr/>
+              <a:endParaRPr dirty="0"/>
             </a:p>
           </p:txBody>
         </p:sp>
@@ -12734,7 +12750,7 @@
                 </a:spcAft>
                 <a:buNone/>
               </a:pPr>
-              <a:endParaRPr/>
+              <a:endParaRPr dirty="0"/>
             </a:p>
           </p:txBody>
         </p:sp>
@@ -12804,7 +12820,7 @@
                 </a:spcAft>
                 <a:buNone/>
               </a:pPr>
-              <a:endParaRPr/>
+              <a:endParaRPr dirty="0"/>
             </a:p>
           </p:txBody>
         </p:sp>
@@ -12857,7 +12873,7 @@
                 </a:spcAft>
                 <a:buNone/>
               </a:pPr>
-              <a:endParaRPr/>
+              <a:endParaRPr dirty="0"/>
             </a:p>
           </p:txBody>
         </p:sp>
@@ -12927,7 +12943,7 @@
                 </a:spcAft>
                 <a:buNone/>
               </a:pPr>
-              <a:endParaRPr/>
+              <a:endParaRPr dirty="0"/>
             </a:p>
           </p:txBody>
         </p:sp>
@@ -12980,7 +12996,7 @@
                 </a:spcAft>
                 <a:buNone/>
               </a:pPr>
-              <a:endParaRPr/>
+              <a:endParaRPr dirty="0"/>
             </a:p>
           </p:txBody>
         </p:sp>
@@ -13075,7 +13091,7 @@
                 </a:spcAft>
                 <a:buNone/>
               </a:pPr>
-              <a:endParaRPr/>
+              <a:endParaRPr dirty="0"/>
             </a:p>
           </p:txBody>
         </p:sp>
@@ -13128,7 +13144,7 @@
                 </a:spcAft>
                 <a:buNone/>
               </a:pPr>
-              <a:endParaRPr/>
+              <a:endParaRPr dirty="0"/>
             </a:p>
           </p:txBody>
         </p:sp>
@@ -13198,7 +13214,7 @@
                 </a:spcAft>
                 <a:buNone/>
               </a:pPr>
-              <a:endParaRPr/>
+              <a:endParaRPr dirty="0"/>
             </a:p>
           </p:txBody>
         </p:sp>
@@ -13251,7 +13267,7 @@
                 </a:spcAft>
                 <a:buNone/>
               </a:pPr>
-              <a:endParaRPr/>
+              <a:endParaRPr dirty="0"/>
             </a:p>
           </p:txBody>
         </p:sp>
@@ -13319,7 +13335,7 @@
                 </a:spcAft>
                 <a:buNone/>
               </a:pPr>
-              <a:endParaRPr/>
+              <a:endParaRPr dirty="0"/>
             </a:p>
           </p:txBody>
         </p:sp>
@@ -13410,7 +13426,7 @@
                   </a:spcAft>
                   <a:buNone/>
                 </a:pPr>
-                <a:endParaRPr/>
+                <a:endParaRPr dirty="0"/>
               </a:p>
             </p:txBody>
           </p:sp>
@@ -13461,7 +13477,7 @@
                   </a:spcAft>
                   <a:buNone/>
                 </a:pPr>
-                <a:endParaRPr/>
+                <a:endParaRPr dirty="0"/>
               </a:p>
             </p:txBody>
           </p:sp>
@@ -13512,7 +13528,7 @@
                   </a:spcAft>
                   <a:buNone/>
                 </a:pPr>
-                <a:endParaRPr/>
+                <a:endParaRPr dirty="0"/>
               </a:p>
             </p:txBody>
           </p:sp>
@@ -13583,7 +13599,7 @@
                 </a:spcAft>
                 <a:buNone/>
               </a:pPr>
-              <a:endParaRPr/>
+              <a:endParaRPr dirty="0"/>
             </a:p>
           </p:txBody>
         </p:sp>
@@ -13636,7 +13652,7 @@
                 </a:spcAft>
                 <a:buNone/>
               </a:pPr>
-              <a:endParaRPr/>
+              <a:endParaRPr dirty="0"/>
             </a:p>
           </p:txBody>
         </p:sp>
@@ -14124,7 +14140,7 @@
                 </a:spcAft>
                 <a:buNone/>
               </a:pPr>
-              <a:endParaRPr/>
+              <a:endParaRPr dirty="0"/>
             </a:p>
           </p:txBody>
         </p:sp>
@@ -14177,7 +14193,7 @@
                 </a:spcAft>
                 <a:buNone/>
               </a:pPr>
-              <a:endParaRPr/>
+              <a:endParaRPr dirty="0"/>
             </a:p>
           </p:txBody>
         </p:sp>
@@ -14247,7 +14263,7 @@
                 </a:spcAft>
                 <a:buNone/>
               </a:pPr>
-              <a:endParaRPr/>
+              <a:endParaRPr dirty="0"/>
             </a:p>
           </p:txBody>
         </p:sp>
@@ -14300,7 +14316,7 @@
                 </a:spcAft>
                 <a:buNone/>
               </a:pPr>
-              <a:endParaRPr/>
+              <a:endParaRPr dirty="0"/>
             </a:p>
           </p:txBody>
         </p:sp>
@@ -14370,7 +14386,7 @@
                 </a:spcAft>
                 <a:buNone/>
               </a:pPr>
-              <a:endParaRPr/>
+              <a:endParaRPr dirty="0"/>
             </a:p>
           </p:txBody>
         </p:sp>
@@ -14423,7 +14439,7 @@
                 </a:spcAft>
                 <a:buNone/>
               </a:pPr>
-              <a:endParaRPr/>
+              <a:endParaRPr dirty="0"/>
             </a:p>
           </p:txBody>
         </p:sp>
@@ -14491,7 +14507,7 @@
                 </a:spcAft>
                 <a:buNone/>
               </a:pPr>
-              <a:endParaRPr/>
+              <a:endParaRPr dirty="0"/>
             </a:p>
           </p:txBody>
         </p:sp>
@@ -14582,7 +14598,7 @@
                   </a:spcAft>
                   <a:buNone/>
                 </a:pPr>
-                <a:endParaRPr/>
+                <a:endParaRPr dirty="0"/>
               </a:p>
             </p:txBody>
           </p:sp>
@@ -14633,7 +14649,7 @@
                   </a:spcAft>
                   <a:buNone/>
                 </a:pPr>
-                <a:endParaRPr/>
+                <a:endParaRPr dirty="0"/>
               </a:p>
             </p:txBody>
           </p:sp>
@@ -14684,7 +14700,7 @@
                   </a:spcAft>
                   <a:buNone/>
                 </a:pPr>
-                <a:endParaRPr/>
+                <a:endParaRPr dirty="0"/>
               </a:p>
             </p:txBody>
           </p:sp>
@@ -14755,7 +14771,7 @@
                 </a:spcAft>
                 <a:buNone/>
               </a:pPr>
-              <a:endParaRPr/>
+              <a:endParaRPr dirty="0"/>
             </a:p>
           </p:txBody>
         </p:sp>
@@ -14808,7 +14824,7 @@
                 </a:spcAft>
                 <a:buNone/>
               </a:pPr>
-              <a:endParaRPr/>
+              <a:endParaRPr dirty="0"/>
             </a:p>
           </p:txBody>
         </p:sp>
@@ -15163,7 +15179,7 @@
                 </a:spcAft>
                 <a:buNone/>
               </a:pPr>
-              <a:endParaRPr/>
+              <a:endParaRPr dirty="0"/>
             </a:p>
           </p:txBody>
         </p:sp>
@@ -15216,7 +15232,7 @@
                 </a:spcAft>
                 <a:buNone/>
               </a:pPr>
-              <a:endParaRPr/>
+              <a:endParaRPr dirty="0"/>
             </a:p>
           </p:txBody>
         </p:sp>
@@ -15360,7 +15376,7 @@
               </a:rPr>
               <a:t>Freepik</a:t>
             </a:r>
-            <a:endParaRPr sz="1000">
+            <a:endParaRPr sz="1000" dirty="0">
               <a:solidFill>
                 <a:srgbClr val="434343"/>
               </a:solidFill>
@@ -15910,43 +15926,7 @@
             </a:lvl9pPr>
           </a:lstStyle>
           <a:p>
-            <a:endParaRPr dirty="0"/>
-          </a:p>
-        </p:txBody>
-      </p:sp>
-      <p:sp>
-        <p:nvSpPr>
-          <p:cNvPr id="3" name="ZoneTexte 2">
-            <a:extLst>
-              <a:ext uri="{FF2B5EF4-FFF2-40B4-BE49-F238E27FC236}">
-                <a16:creationId xmlns:a16="http://schemas.microsoft.com/office/drawing/2014/main" id="{D867FE35-F1F4-D539-8144-CA2F43C24F22}"/>
-              </a:ext>
-            </a:extLst>
-          </p:cNvPr>
-          <p:cNvSpPr txBox="1"/>
-          <p:nvPr userDrawn="1"/>
-        </p:nvSpPr>
-        <p:spPr>
-          <a:xfrm>
-            <a:off x="8505525" y="4568875"/>
-            <a:ext cx="505125" cy="307777"/>
-          </a:xfrm>
-          <a:prstGeom prst="rect">
-            <a:avLst/>
-          </a:prstGeom>
-          <a:noFill/>
-        </p:spPr>
-        <p:txBody>
-          <a:bodyPr wrap="square" rtlCol="0">
-            <a:spAutoFit/>
-          </a:bodyPr>
-          <a:lstStyle/>
-          <a:p>
-            <a:r>
-              <a:rPr lang="en-US" dirty="0"/>
-              <a:t>&lt;#&gt;</a:t>
-            </a:r>
-            <a:endParaRPr lang="fr-FR" dirty="0"/>
+            <a:endParaRPr/>
           </a:p>
         </p:txBody>
       </p:sp>
@@ -15966,7 +15946,7 @@
     <p:sldLayoutId id="2147483671" r:id="rId10"/>
     <p:sldLayoutId id="2147483672" r:id="rId11"/>
   </p:sldLayoutIdLst>
-  <p:hf hdr="0" ftr="0"/>
+  <p:hf hdr="0" ftr="0" dt="0"/>
   <p:txStyles>
     <p:titleStyle>
       <a:defPPr marR="0" lvl="0" algn="l" rtl="0">
@@ -16733,7 +16713,7 @@
               </a:spcAft>
               <a:buNone/>
             </a:pPr>
-            <a:endParaRPr/>
+            <a:endParaRPr dirty="0"/>
           </a:p>
         </p:txBody>
       </p:sp>
@@ -16824,12 +16804,8 @@
               <a:buNone/>
             </a:pPr>
             <a:r>
-              <a:rPr lang="en-US" dirty="0" err="1"/>
-              <a:t>Presenté</a:t>
-            </a:r>
-            <a:r>
               <a:rPr lang="en-US" dirty="0"/>
-              <a:t> par :</a:t>
+              <a:t>Presented par :</a:t>
             </a:r>
           </a:p>
           <a:p>
@@ -16844,43 +16820,7 @@
             </a:pPr>
             <a:r>
               <a:rPr lang="en-US" dirty="0"/>
-              <a:t>- Gajja Nour </a:t>
-            </a:r>
-            <a:r>
-              <a:rPr lang="en-US" dirty="0" err="1"/>
-              <a:t>Eddine</a:t>
-            </a:r>
-            <a:endParaRPr lang="en-US" dirty="0"/>
-          </a:p>
-          <a:p>
-            <a:pPr marL="0" lvl="0" indent="0" algn="l" rtl="0">
-              <a:spcBef>
-                <a:spcPts val="0"/>
-              </a:spcBef>
-              <a:spcAft>
-                <a:spcPts val="0"/>
-              </a:spcAft>
-              <a:buNone/>
-            </a:pPr>
-            <a:r>
-              <a:rPr lang="en-US" dirty="0"/>
-              <a:t>- </a:t>
-            </a:r>
-            <a:r>
-              <a:rPr lang="en-US" dirty="0" err="1"/>
-              <a:t>Abatour</a:t>
-            </a:r>
-            <a:r>
-              <a:rPr lang="en-US" dirty="0"/>
-              <a:t> </a:t>
-            </a:r>
-            <a:r>
-              <a:rPr lang="en-US" dirty="0" err="1"/>
-              <a:t>Driss</a:t>
-            </a:r>
-            <a:r>
-              <a:rPr lang="en-US" dirty="0"/>
-              <a:t> </a:t>
+              <a:t>- Gajja Nour Eddine</a:t>
             </a:r>
           </a:p>
           <a:p>
@@ -16895,15 +16835,22 @@
             </a:pPr>
             <a:r>
               <a:rPr lang="en-US" dirty="0"/>
-              <a:t>- </a:t>
+              <a:t>- Abatour Driss </a:t>
             </a:r>
-            <a:r>
-              <a:rPr lang="en-US" dirty="0" err="1"/>
-              <a:t>Bouhlali</a:t>
-            </a:r>
+          </a:p>
+          <a:p>
+            <a:pPr marL="0" lvl="0" indent="0" algn="l" rtl="0">
+              <a:spcBef>
+                <a:spcPts val="0"/>
+              </a:spcBef>
+              <a:spcAft>
+                <a:spcPts val="0"/>
+              </a:spcAft>
+              <a:buNone/>
+            </a:pPr>
             <a:r>
               <a:rPr lang="en-US" dirty="0"/>
-              <a:t> Abdelfattah </a:t>
+              <a:t>- Bouhlali Abdelfattah </a:t>
             </a:r>
           </a:p>
         </p:txBody>
@@ -17197,13 +17144,8 @@
             <a:pPr marL="0" indent="0" algn="l"/>
             <a:r>
               <a:rPr lang="en-US" dirty="0"/>
-              <a:t>- HAKEM </a:t>
+              <a:t>- HAKEM Adnane</a:t>
             </a:r>
-            <a:r>
-              <a:rPr lang="en-US" dirty="0" err="1"/>
-              <a:t>Adnane</a:t>
-            </a:r>
-            <a:endParaRPr lang="en-US" dirty="0"/>
           </a:p>
         </p:txBody>
       </p:sp>
@@ -17525,6 +17467,59 @@
           </a:prstGeom>
         </p:spPr>
       </p:pic>
+      <p:sp>
+        <p:nvSpPr>
+          <p:cNvPr id="4" name="ZoneTexte 3"/>
+          <p:cNvSpPr txBox="1"/>
+          <p:nvPr/>
+        </p:nvSpPr>
+        <p:spPr>
+          <a:xfrm>
+            <a:off x="8374642" y="400826"/>
+            <a:ext cx="340536" cy="461665"/>
+          </a:xfrm>
+          <a:prstGeom prst="rect">
+            <a:avLst/>
+          </a:prstGeom>
+        </p:spPr>
+        <p:style>
+          <a:lnRef idx="2">
+            <a:schemeClr val="dk1">
+              <a:shade val="50000"/>
+            </a:schemeClr>
+          </a:lnRef>
+          <a:fillRef idx="1">
+            <a:schemeClr val="dk1"/>
+          </a:fillRef>
+          <a:effectRef idx="0">
+            <a:schemeClr val="dk1"/>
+          </a:effectRef>
+          <a:fontRef idx="minor">
+            <a:schemeClr val="lt1"/>
+          </a:fontRef>
+        </p:style>
+        <p:txBody>
+          <a:bodyPr wrap="square" rtlCol="0">
+            <a:spAutoFit/>
+          </a:bodyPr>
+          <a:lstStyle/>
+          <a:p>
+            <a:r>
+              <a:rPr lang="en-CA" sz="2400" dirty="0">
+                <a:solidFill>
+                  <a:schemeClr val="accent2"/>
+                </a:solidFill>
+              </a:rPr>
+              <a:t>1</a:t>
+            </a:r>
+            <a:endParaRPr lang="fr-FR" sz="2400" dirty="0">
+              <a:solidFill>
+                <a:schemeClr val="accent2"/>
+              </a:solidFill>
+            </a:endParaRPr>
+          </a:p>
+        </p:txBody>
+      </p:sp>
     </p:spTree>
   </p:cSld>
   <p:clrMapOvr>
@@ -17642,7 +17637,7 @@
                 </a:spcAft>
                 <a:buNone/>
               </a:pPr>
-              <a:endParaRPr/>
+              <a:endParaRPr dirty="0"/>
             </a:p>
           </p:txBody>
         </p:sp>
@@ -17690,7 +17685,7 @@
                 </a:spcAft>
                 <a:buNone/>
               </a:pPr>
-              <a:endParaRPr/>
+              <a:endParaRPr dirty="0"/>
             </a:p>
           </p:txBody>
         </p:sp>
@@ -17738,7 +17733,7 @@
                 </a:spcAft>
                 <a:buNone/>
               </a:pPr>
-              <a:endParaRPr/>
+              <a:endParaRPr dirty="0"/>
             </a:p>
           </p:txBody>
         </p:sp>
@@ -17773,6 +17768,59 @@
           </a:prstGeom>
         </p:spPr>
       </p:pic>
+      <p:sp>
+        <p:nvSpPr>
+          <p:cNvPr id="12" name="ZoneTexte 11"/>
+          <p:cNvSpPr txBox="1"/>
+          <p:nvPr/>
+        </p:nvSpPr>
+        <p:spPr>
+          <a:xfrm>
+            <a:off x="8046721" y="435127"/>
+            <a:ext cx="687376" cy="461665"/>
+          </a:xfrm>
+          <a:prstGeom prst="rect">
+            <a:avLst/>
+          </a:prstGeom>
+        </p:spPr>
+        <p:style>
+          <a:lnRef idx="2">
+            <a:schemeClr val="dk1">
+              <a:shade val="50000"/>
+            </a:schemeClr>
+          </a:lnRef>
+          <a:fillRef idx="1">
+            <a:schemeClr val="dk1"/>
+          </a:fillRef>
+          <a:effectRef idx="0">
+            <a:schemeClr val="dk1"/>
+          </a:effectRef>
+          <a:fontRef idx="minor">
+            <a:schemeClr val="lt1"/>
+          </a:fontRef>
+        </p:style>
+        <p:txBody>
+          <a:bodyPr wrap="square" rtlCol="0">
+            <a:spAutoFit/>
+          </a:bodyPr>
+          <a:lstStyle/>
+          <a:p>
+            <a:r>
+              <a:rPr lang="en-CA" sz="2400" dirty="0">
+                <a:solidFill>
+                  <a:schemeClr val="accent2"/>
+                </a:solidFill>
+              </a:rPr>
+              <a:t>10</a:t>
+            </a:r>
+            <a:endParaRPr lang="fr-FR" sz="2400" dirty="0">
+              <a:solidFill>
+                <a:schemeClr val="accent2"/>
+              </a:solidFill>
+            </a:endParaRPr>
+          </a:p>
+        </p:txBody>
+      </p:sp>
     </p:spTree>
   </p:cSld>
   <p:clrMapOvr>
@@ -17890,7 +17938,7 @@
                 </a:spcAft>
                 <a:buNone/>
               </a:pPr>
-              <a:endParaRPr/>
+              <a:endParaRPr dirty="0"/>
             </a:p>
           </p:txBody>
         </p:sp>
@@ -17938,7 +17986,7 @@
                 </a:spcAft>
                 <a:buNone/>
               </a:pPr>
-              <a:endParaRPr/>
+              <a:endParaRPr dirty="0"/>
             </a:p>
           </p:txBody>
         </p:sp>
@@ -17986,7 +18034,7 @@
                 </a:spcAft>
                 <a:buNone/>
               </a:pPr>
-              <a:endParaRPr/>
+              <a:endParaRPr dirty="0"/>
             </a:p>
           </p:txBody>
         </p:sp>
@@ -18044,15 +18092,7 @@
           <a:p>
             <a:r>
               <a:rPr lang="fr-FR" sz="2400" dirty="0"/>
-              <a:t>Pour accéder à cars.txt dans le même dossier que "</a:t>
-            </a:r>
-            <a:r>
-              <a:rPr lang="fr-FR" sz="2400" dirty="0" err="1"/>
-              <a:t>path</a:t>
-            </a:r>
-            <a:r>
-              <a:rPr lang="fr-FR" sz="2400" dirty="0"/>
-              <a:t>":</a:t>
+              <a:t>Pour accéder à cars.txt dans le même dossier que "path":</a:t>
             </a:r>
           </a:p>
           <a:p>
@@ -18065,23 +18105,7 @@
             </a:pPr>
             <a:r>
               <a:rPr lang="fr-FR" sz="2000" dirty="0"/>
-              <a:t>Chemin du Dossier: </a:t>
-            </a:r>
-            <a:r>
-              <a:rPr lang="fr-FR" sz="2000" dirty="0" err="1"/>
-              <a:t>path</a:t>
-            </a:r>
-            <a:r>
-              <a:rPr lang="fr-FR" sz="2000" dirty="0"/>
-              <a:t>/</a:t>
-            </a:r>
-            <a:r>
-              <a:rPr lang="fr-FR" sz="2000" dirty="0" err="1"/>
-              <a:t>vehicules</a:t>
-            </a:r>
-            <a:r>
-              <a:rPr lang="fr-FR" sz="2000" dirty="0"/>
-              <a:t>/</a:t>
+              <a:t>Chemin du Dossier: path/véhicules/</a:t>
             </a:r>
           </a:p>
           <a:p>
@@ -18096,6 +18120,59 @@
               <a:rPr lang="fr-FR" sz="2000" dirty="0"/>
               <a:t>Nom du Fichier: cars</a:t>
             </a:r>
+          </a:p>
+        </p:txBody>
+      </p:sp>
+      <p:sp>
+        <p:nvSpPr>
+          <p:cNvPr id="13" name="ZoneTexte 12"/>
+          <p:cNvSpPr txBox="1"/>
+          <p:nvPr/>
+        </p:nvSpPr>
+        <p:spPr>
+          <a:xfrm>
+            <a:off x="8046721" y="435127"/>
+            <a:ext cx="687376" cy="461665"/>
+          </a:xfrm>
+          <a:prstGeom prst="rect">
+            <a:avLst/>
+          </a:prstGeom>
+        </p:spPr>
+        <p:style>
+          <a:lnRef idx="2">
+            <a:schemeClr val="dk1">
+              <a:shade val="50000"/>
+            </a:schemeClr>
+          </a:lnRef>
+          <a:fillRef idx="1">
+            <a:schemeClr val="dk1"/>
+          </a:fillRef>
+          <a:effectRef idx="0">
+            <a:schemeClr val="dk1"/>
+          </a:effectRef>
+          <a:fontRef idx="minor">
+            <a:schemeClr val="lt1"/>
+          </a:fontRef>
+        </p:style>
+        <p:txBody>
+          <a:bodyPr wrap="square" rtlCol="0">
+            <a:spAutoFit/>
+          </a:bodyPr>
+          <a:lstStyle/>
+          <a:p>
+            <a:r>
+              <a:rPr lang="en-CA" sz="2400" dirty="0">
+                <a:solidFill>
+                  <a:schemeClr val="accent2"/>
+                </a:solidFill>
+              </a:rPr>
+              <a:t>11</a:t>
+            </a:r>
+            <a:endParaRPr lang="fr-FR" sz="2400" dirty="0">
+              <a:solidFill>
+                <a:schemeClr val="accent2"/>
+              </a:solidFill>
+            </a:endParaRPr>
           </a:p>
         </p:txBody>
       </p:sp>
@@ -18221,7 +18298,7 @@
                 </a:spcAft>
                 <a:buNone/>
               </a:pPr>
-              <a:endParaRPr/>
+              <a:endParaRPr dirty="0"/>
             </a:p>
           </p:txBody>
         </p:sp>
@@ -18269,7 +18346,7 @@
                 </a:spcAft>
                 <a:buNone/>
               </a:pPr>
-              <a:endParaRPr/>
+              <a:endParaRPr dirty="0"/>
             </a:p>
           </p:txBody>
         </p:sp>
@@ -18317,7 +18394,7 @@
                 </a:spcAft>
                 <a:buNone/>
               </a:pPr>
-              <a:endParaRPr/>
+              <a:endParaRPr dirty="0"/>
             </a:p>
           </p:txBody>
         </p:sp>
@@ -18375,7 +18452,15 @@
           <a:p>
             <a:r>
               <a:rPr lang="fr-FR" sz="2400" dirty="0"/>
-              <a:t>Utilisation de « .. » pour remonter d'un répertoire :</a:t>
+              <a:t>Utilisation de «  </a:t>
+            </a:r>
+            <a:r>
+              <a:rPr lang="fr-FR" sz="2400" b="1" dirty="0"/>
+              <a:t>cd .. </a:t>
+            </a:r>
+            <a:r>
+              <a:rPr lang="fr-FR" sz="2400" dirty="0"/>
+              <a:t> » pour remonter d'un répertoire :</a:t>
             </a:r>
           </a:p>
           <a:p>
@@ -18401,13 +18486,66 @@
               <a:t>Accès au fichier planes.txt dans le répertoire </a:t>
             </a:r>
             <a:r>
-              <a:rPr lang="fr-FR" sz="2400" dirty="0" err="1"/>
+              <a:rPr lang="fr-FR" sz="2400" b="1" dirty="0"/>
               <a:t>path</a:t>
             </a:r>
             <a:r>
               <a:rPr lang="fr-FR" sz="2400" dirty="0"/>
               <a:t>.</a:t>
             </a:r>
+          </a:p>
+        </p:txBody>
+      </p:sp>
+      <p:sp>
+        <p:nvSpPr>
+          <p:cNvPr id="12" name="ZoneTexte 11"/>
+          <p:cNvSpPr txBox="1"/>
+          <p:nvPr/>
+        </p:nvSpPr>
+        <p:spPr>
+          <a:xfrm>
+            <a:off x="8046721" y="435127"/>
+            <a:ext cx="687376" cy="461665"/>
+          </a:xfrm>
+          <a:prstGeom prst="rect">
+            <a:avLst/>
+          </a:prstGeom>
+        </p:spPr>
+        <p:style>
+          <a:lnRef idx="2">
+            <a:schemeClr val="dk1">
+              <a:shade val="50000"/>
+            </a:schemeClr>
+          </a:lnRef>
+          <a:fillRef idx="1">
+            <a:schemeClr val="dk1"/>
+          </a:fillRef>
+          <a:effectRef idx="0">
+            <a:schemeClr val="dk1"/>
+          </a:effectRef>
+          <a:fontRef idx="minor">
+            <a:schemeClr val="lt1"/>
+          </a:fontRef>
+        </p:style>
+        <p:txBody>
+          <a:bodyPr wrap="square" rtlCol="0">
+            <a:spAutoFit/>
+          </a:bodyPr>
+          <a:lstStyle/>
+          <a:p>
+            <a:r>
+              <a:rPr lang="en-CA" sz="2400" dirty="0">
+                <a:solidFill>
+                  <a:schemeClr val="accent2"/>
+                </a:solidFill>
+              </a:rPr>
+              <a:t>12</a:t>
+            </a:r>
+            <a:endParaRPr lang="fr-FR" sz="2400" dirty="0">
+              <a:solidFill>
+                <a:schemeClr val="accent2"/>
+              </a:solidFill>
+            </a:endParaRPr>
           </a:p>
         </p:txBody>
       </p:sp>
@@ -18514,7 +18652,15 @@
             </a:pPr>
             <a:r>
               <a:rPr lang="fr-FR" sz="2400" dirty="0"/>
-              <a:t>La compréhension des chemins de fichiers est IMPORTANT pour la navigation efficace à travers les systèmes de fichiers.</a:t>
+              <a:t>La compréhension des chemins de fichiers est </a:t>
+            </a:r>
+            <a:r>
+              <a:rPr lang="fr-FR" sz="2400" b="1" dirty="0"/>
+              <a:t>IMPORTANT</a:t>
+            </a:r>
+            <a:r>
+              <a:rPr lang="fr-FR" sz="2400" dirty="0"/>
+              <a:t> pour la navigation efficace à travers les systèmes de fichiers.</a:t>
             </a:r>
           </a:p>
           <a:p>
@@ -18533,6 +18679,59 @@
               <a:rPr lang="fr-FR" sz="2400" dirty="0"/>
               <a:t>Utiliser les composants du chemin de fichier facilite l'accès aux fichiers dans une structure hiérarchique.</a:t>
             </a:r>
+          </a:p>
+        </p:txBody>
+      </p:sp>
+      <p:sp>
+        <p:nvSpPr>
+          <p:cNvPr id="4" name="ZoneTexte 3"/>
+          <p:cNvSpPr txBox="1"/>
+          <p:nvPr/>
+        </p:nvSpPr>
+        <p:spPr>
+          <a:xfrm>
+            <a:off x="8046721" y="435127"/>
+            <a:ext cx="687376" cy="461665"/>
+          </a:xfrm>
+          <a:prstGeom prst="rect">
+            <a:avLst/>
+          </a:prstGeom>
+        </p:spPr>
+        <p:style>
+          <a:lnRef idx="2">
+            <a:schemeClr val="dk1">
+              <a:shade val="50000"/>
+            </a:schemeClr>
+          </a:lnRef>
+          <a:fillRef idx="1">
+            <a:schemeClr val="dk1"/>
+          </a:fillRef>
+          <a:effectRef idx="0">
+            <a:schemeClr val="dk1"/>
+          </a:effectRef>
+          <a:fontRef idx="minor">
+            <a:schemeClr val="lt1"/>
+          </a:fontRef>
+        </p:style>
+        <p:txBody>
+          <a:bodyPr wrap="square" rtlCol="0">
+            <a:spAutoFit/>
+          </a:bodyPr>
+          <a:lstStyle/>
+          <a:p>
+            <a:r>
+              <a:rPr lang="en-CA" sz="2400" dirty="0">
+                <a:solidFill>
+                  <a:schemeClr val="accent2"/>
+                </a:solidFill>
+              </a:rPr>
+              <a:t>13</a:t>
+            </a:r>
+            <a:endParaRPr lang="fr-FR" sz="2400" dirty="0">
+              <a:solidFill>
+                <a:schemeClr val="accent2"/>
+              </a:solidFill>
+            </a:endParaRPr>
           </a:p>
         </p:txBody>
       </p:sp>
@@ -18664,7 +18863,7 @@
                 </a:spcAft>
                 <a:buNone/>
               </a:pPr>
-              <a:endParaRPr/>
+              <a:endParaRPr dirty="0"/>
             </a:p>
           </p:txBody>
         </p:sp>
@@ -18717,7 +18916,7 @@
                 </a:spcAft>
                 <a:buNone/>
               </a:pPr>
-              <a:endParaRPr/>
+              <a:endParaRPr dirty="0"/>
             </a:p>
           </p:txBody>
         </p:sp>
@@ -18813,7 +19012,7 @@
               </a:spcAft>
               <a:buNone/>
             </a:pPr>
-            <a:endParaRPr/>
+            <a:endParaRPr dirty="0"/>
           </a:p>
         </p:txBody>
       </p:sp>
@@ -18850,8 +19049,61 @@
                 </a:solidFill>
                 <a:latin typeface="Helvetica Neue"/>
               </a:rPr>
-              <a:t>Ouverture et Fermeture de Fichiers</a:t>
+              <a:t>Ouverture et Fermeture des Fichiers</a:t>
             </a:r>
+          </a:p>
+        </p:txBody>
+      </p:sp>
+      <p:sp>
+        <p:nvSpPr>
+          <p:cNvPr id="10" name="ZoneTexte 9"/>
+          <p:cNvSpPr txBox="1"/>
+          <p:nvPr/>
+        </p:nvSpPr>
+        <p:spPr>
+          <a:xfrm>
+            <a:off x="8046721" y="435127"/>
+            <a:ext cx="687376" cy="461665"/>
+          </a:xfrm>
+          <a:prstGeom prst="rect">
+            <a:avLst/>
+          </a:prstGeom>
+        </p:spPr>
+        <p:style>
+          <a:lnRef idx="2">
+            <a:schemeClr val="dk1">
+              <a:shade val="50000"/>
+            </a:schemeClr>
+          </a:lnRef>
+          <a:fillRef idx="1">
+            <a:schemeClr val="dk1"/>
+          </a:fillRef>
+          <a:effectRef idx="0">
+            <a:schemeClr val="dk1"/>
+          </a:effectRef>
+          <a:fontRef idx="minor">
+            <a:schemeClr val="lt1"/>
+          </a:fontRef>
+        </p:style>
+        <p:txBody>
+          <a:bodyPr wrap="square" rtlCol="0">
+            <a:spAutoFit/>
+          </a:bodyPr>
+          <a:lstStyle/>
+          <a:p>
+            <a:r>
+              <a:rPr lang="en-CA" sz="2400" dirty="0">
+                <a:solidFill>
+                  <a:schemeClr val="accent2"/>
+                </a:solidFill>
+              </a:rPr>
+              <a:t>14</a:t>
+            </a:r>
+            <a:endParaRPr lang="fr-FR" sz="2400" dirty="0">
+              <a:solidFill>
+                <a:schemeClr val="accent2"/>
+              </a:solidFill>
+            </a:endParaRPr>
           </a:p>
         </p:txBody>
       </p:sp>
@@ -18934,7 +19186,7 @@
               </a:spcAft>
               <a:buNone/>
             </a:pPr>
-            <a:endParaRPr/>
+            <a:endParaRPr dirty="0"/>
           </a:p>
         </p:txBody>
       </p:sp>
@@ -19058,9 +19310,84 @@
                   <a:noFill/>
                 </a:uFill>
               </a:rPr>
-              <a:t>La fonction intégrée « open() » est utilisée pour ouvrir un fichier, prenant le chemin du fichier comme argument.</a:t>
+              <a:t>La fonction intégrée « </a:t>
+            </a:r>
+            <a:r>
+              <a:rPr lang="fr-FR" sz="2000" b="1" dirty="0">
+                <a:solidFill>
+                  <a:schemeClr val="hlink"/>
+                </a:solidFill>
+                <a:uFill>
+                  <a:noFill/>
+                </a:uFill>
+              </a:rPr>
+              <a:t>open()</a:t>
+            </a:r>
+            <a:r>
+              <a:rPr lang="fr-FR" sz="2000" dirty="0">
+                <a:solidFill>
+                  <a:schemeClr val="hlink"/>
+                </a:solidFill>
+                <a:uFill>
+                  <a:noFill/>
+                </a:uFill>
+              </a:rPr>
+              <a:t> » est utilisée pour ouvrir un fichier, prenant le chemin du fichier comme argument.</a:t>
             </a:r>
             <a:endParaRPr sz="2000" dirty="0"/>
+          </a:p>
+        </p:txBody>
+      </p:sp>
+      <p:sp>
+        <p:nvSpPr>
+          <p:cNvPr id="4" name="ZoneTexte 3"/>
+          <p:cNvSpPr txBox="1"/>
+          <p:nvPr/>
+        </p:nvSpPr>
+        <p:spPr>
+          <a:xfrm>
+            <a:off x="8046721" y="435127"/>
+            <a:ext cx="687376" cy="461665"/>
+          </a:xfrm>
+          <a:prstGeom prst="rect">
+            <a:avLst/>
+          </a:prstGeom>
+        </p:spPr>
+        <p:style>
+          <a:lnRef idx="2">
+            <a:schemeClr val="dk1">
+              <a:shade val="50000"/>
+            </a:schemeClr>
+          </a:lnRef>
+          <a:fillRef idx="1">
+            <a:schemeClr val="dk1"/>
+          </a:fillRef>
+          <a:effectRef idx="0">
+            <a:schemeClr val="dk1"/>
+          </a:effectRef>
+          <a:fontRef idx="minor">
+            <a:schemeClr val="lt1"/>
+          </a:fontRef>
+        </p:style>
+        <p:txBody>
+          <a:bodyPr wrap="square" rtlCol="0">
+            <a:spAutoFit/>
+          </a:bodyPr>
+          <a:lstStyle/>
+          <a:p>
+            <a:r>
+              <a:rPr lang="en-CA" sz="2400" dirty="0">
+                <a:solidFill>
+                  <a:schemeClr val="accent2"/>
+                </a:solidFill>
+              </a:rPr>
+              <a:t>15</a:t>
+            </a:r>
+            <a:endParaRPr lang="fr-FR" sz="2400" dirty="0">
+              <a:solidFill>
+                <a:schemeClr val="accent2"/>
+              </a:solidFill>
+            </a:endParaRPr>
           </a:p>
         </p:txBody>
       </p:sp>
@@ -19143,7 +19470,7 @@
               </a:spcAft>
               <a:buNone/>
             </a:pPr>
-            <a:endParaRPr/>
+            <a:endParaRPr dirty="0"/>
           </a:p>
         </p:txBody>
       </p:sp>
@@ -19234,6 +19561,59 @@
           </a:prstGeom>
         </p:spPr>
       </p:pic>
+      <p:sp>
+        <p:nvSpPr>
+          <p:cNvPr id="6" name="ZoneTexte 5"/>
+          <p:cNvSpPr txBox="1"/>
+          <p:nvPr/>
+        </p:nvSpPr>
+        <p:spPr>
+          <a:xfrm>
+            <a:off x="8046721" y="435127"/>
+            <a:ext cx="687376" cy="461665"/>
+          </a:xfrm>
+          <a:prstGeom prst="rect">
+            <a:avLst/>
+          </a:prstGeom>
+        </p:spPr>
+        <p:style>
+          <a:lnRef idx="2">
+            <a:schemeClr val="dk1">
+              <a:shade val="50000"/>
+            </a:schemeClr>
+          </a:lnRef>
+          <a:fillRef idx="1">
+            <a:schemeClr val="dk1"/>
+          </a:fillRef>
+          <a:effectRef idx="0">
+            <a:schemeClr val="dk1"/>
+          </a:effectRef>
+          <a:fontRef idx="minor">
+            <a:schemeClr val="lt1"/>
+          </a:fontRef>
+        </p:style>
+        <p:txBody>
+          <a:bodyPr wrap="square" rtlCol="0">
+            <a:spAutoFit/>
+          </a:bodyPr>
+          <a:lstStyle/>
+          <a:p>
+            <a:r>
+              <a:rPr lang="en-CA" sz="2400" dirty="0">
+                <a:solidFill>
+                  <a:schemeClr val="accent2"/>
+                </a:solidFill>
+              </a:rPr>
+              <a:t>15</a:t>
+            </a:r>
+            <a:endParaRPr lang="fr-FR" sz="2400" dirty="0">
+              <a:solidFill>
+                <a:schemeClr val="accent2"/>
+              </a:solidFill>
+            </a:endParaRPr>
+          </a:p>
+        </p:txBody>
+      </p:sp>
     </p:spTree>
     <p:extLst>
       <p:ext uri="{BB962C8B-B14F-4D97-AF65-F5344CB8AC3E}">
@@ -19313,7 +19693,7 @@
               </a:spcAft>
               <a:buNone/>
             </a:pPr>
-            <a:endParaRPr/>
+            <a:endParaRPr dirty="0"/>
           </a:p>
         </p:txBody>
       </p:sp>
@@ -19373,9 +19753,8 @@
             </a:endParaRPr>
           </a:p>
           <a:p>
-            <a:pPr marL="285750" indent="-285750"/>
             <a:r>
-              <a:rPr lang="fr-FR" sz="1800" dirty="0">
+              <a:rPr lang="fr-FR" sz="1800" b="1" dirty="0">
                 <a:solidFill>
                   <a:schemeClr val="dk1"/>
                 </a:solidFill>
@@ -19384,7 +19763,23 @@
                 <a:cs typeface="Varela Round"/>
                 <a:sym typeface="Varela Round"/>
               </a:rPr>
-              <a:t>Il est crucial de fermer correctement un fichier ouvert pour libérer les ressources système et assurer l'enregistrement des modifications.</a:t>
+              <a:t>Il est </a:t>
+            </a:r>
+            <a:r>
+              <a:rPr lang="fr-FR" sz="1800" b="1" dirty="0"/>
+              <a:t>Important </a:t>
+            </a:r>
+            <a:r>
+              <a:rPr lang="fr-FR" sz="1800" b="1" dirty="0">
+                <a:solidFill>
+                  <a:schemeClr val="dk1"/>
+                </a:solidFill>
+                <a:latin typeface="Varela Round"/>
+                <a:ea typeface="Varela Round"/>
+                <a:cs typeface="Varela Round"/>
+                <a:sym typeface="Varela Round"/>
+              </a:rPr>
+              <a:t>de fermer correctement un fichier ouvert pour libérer les ressources système et assurer l'enregistrement des modifications.</a:t>
             </a:r>
           </a:p>
           <a:p>
@@ -19451,6 +19846,59 @@
           </a:prstGeom>
         </p:spPr>
       </p:pic>
+      <p:sp>
+        <p:nvSpPr>
+          <p:cNvPr id="5" name="ZoneTexte 4"/>
+          <p:cNvSpPr txBox="1"/>
+          <p:nvPr/>
+        </p:nvSpPr>
+        <p:spPr>
+          <a:xfrm>
+            <a:off x="8046721" y="435127"/>
+            <a:ext cx="687376" cy="461665"/>
+          </a:xfrm>
+          <a:prstGeom prst="rect">
+            <a:avLst/>
+          </a:prstGeom>
+        </p:spPr>
+        <p:style>
+          <a:lnRef idx="2">
+            <a:schemeClr val="dk1">
+              <a:shade val="50000"/>
+            </a:schemeClr>
+          </a:lnRef>
+          <a:fillRef idx="1">
+            <a:schemeClr val="dk1"/>
+          </a:fillRef>
+          <a:effectRef idx="0">
+            <a:schemeClr val="dk1"/>
+          </a:effectRef>
+          <a:fontRef idx="minor">
+            <a:schemeClr val="lt1"/>
+          </a:fontRef>
+        </p:style>
+        <p:txBody>
+          <a:bodyPr wrap="square" rtlCol="0">
+            <a:spAutoFit/>
+          </a:bodyPr>
+          <a:lstStyle/>
+          <a:p>
+            <a:r>
+              <a:rPr lang="en-CA" sz="2400" dirty="0">
+                <a:solidFill>
+                  <a:schemeClr val="accent2"/>
+                </a:solidFill>
+              </a:rPr>
+              <a:t>16</a:t>
+            </a:r>
+            <a:endParaRPr lang="fr-FR" sz="2400" dirty="0">
+              <a:solidFill>
+                <a:schemeClr val="accent2"/>
+              </a:solidFill>
+            </a:endParaRPr>
+          </a:p>
+        </p:txBody>
+      </p:sp>
     </p:spTree>
     <p:extLst>
       <p:ext uri="{BB962C8B-B14F-4D97-AF65-F5344CB8AC3E}">
@@ -19530,7 +19978,7 @@
               </a:spcAft>
               <a:buNone/>
             </a:pPr>
-            <a:endParaRPr/>
+            <a:endParaRPr dirty="0"/>
           </a:p>
         </p:txBody>
       </p:sp>
@@ -19572,31 +20020,7 @@
                 <a:cs typeface="Varela Round"/>
                 <a:sym typeface="Varela Round"/>
               </a:rPr>
-              <a:t>Fermeture d'un Fichier - Deuxième Méthode (Utilisation de '</a:t>
-            </a:r>
-            <a:r>
-              <a:rPr lang="fr-FR" sz="1800" b="1" dirty="0" err="1">
-                <a:solidFill>
-                  <a:schemeClr val="dk1"/>
-                </a:solidFill>
-                <a:latin typeface="Varela Round"/>
-                <a:ea typeface="Varela Round"/>
-                <a:cs typeface="Varela Round"/>
-                <a:sym typeface="Varela Round"/>
-              </a:rPr>
-              <a:t>with</a:t>
-            </a:r>
-            <a:r>
-              <a:rPr lang="fr-FR" sz="1800" b="1" dirty="0">
-                <a:solidFill>
-                  <a:schemeClr val="dk1"/>
-                </a:solidFill>
-                <a:latin typeface="Varela Round"/>
-                <a:ea typeface="Varela Round"/>
-                <a:cs typeface="Varela Round"/>
-                <a:sym typeface="Varela Round"/>
-              </a:rPr>
-              <a:t>')</a:t>
+              <a:t>Fermeture d'un Fichier - Deuxième Méthode (Utilisation de 'with')</a:t>
             </a:r>
           </a:p>
           <a:p>
@@ -19628,7 +20052,7 @@
               <a:t>Utilisation de l'instruction « </a:t>
             </a:r>
             <a:r>
-              <a:rPr lang="fr-FR" sz="1800" dirty="0" err="1">
+              <a:rPr lang="fr-FR" sz="1800" b="1" dirty="0">
                 <a:solidFill>
                   <a:schemeClr val="dk1"/>
                 </a:solidFill>
@@ -19687,6 +20111,59 @@
           </a:prstGeom>
         </p:spPr>
       </p:pic>
+      <p:sp>
+        <p:nvSpPr>
+          <p:cNvPr id="5" name="ZoneTexte 4"/>
+          <p:cNvSpPr txBox="1"/>
+          <p:nvPr/>
+        </p:nvSpPr>
+        <p:spPr>
+          <a:xfrm>
+            <a:off x="8046721" y="435127"/>
+            <a:ext cx="687376" cy="461665"/>
+          </a:xfrm>
+          <a:prstGeom prst="rect">
+            <a:avLst/>
+          </a:prstGeom>
+        </p:spPr>
+        <p:style>
+          <a:lnRef idx="2">
+            <a:schemeClr val="dk1">
+              <a:shade val="50000"/>
+            </a:schemeClr>
+          </a:lnRef>
+          <a:fillRef idx="1">
+            <a:schemeClr val="dk1"/>
+          </a:fillRef>
+          <a:effectRef idx="0">
+            <a:schemeClr val="dk1"/>
+          </a:effectRef>
+          <a:fontRef idx="minor">
+            <a:schemeClr val="lt1"/>
+          </a:fontRef>
+        </p:style>
+        <p:txBody>
+          <a:bodyPr wrap="square" rtlCol="0">
+            <a:spAutoFit/>
+          </a:bodyPr>
+          <a:lstStyle/>
+          <a:p>
+            <a:r>
+              <a:rPr lang="en-CA" sz="2400" dirty="0">
+                <a:solidFill>
+                  <a:schemeClr val="accent2"/>
+                </a:solidFill>
+              </a:rPr>
+              <a:t>17</a:t>
+            </a:r>
+            <a:endParaRPr lang="fr-FR" sz="2400" dirty="0">
+              <a:solidFill>
+                <a:schemeClr val="accent2"/>
+              </a:solidFill>
+            </a:endParaRPr>
+          </a:p>
+        </p:txBody>
+      </p:sp>
     </p:spTree>
     <p:extLst>
       <p:ext uri="{BB962C8B-B14F-4D97-AF65-F5344CB8AC3E}">
@@ -19766,7 +20243,7 @@
               </a:spcAft>
               <a:buNone/>
             </a:pPr>
-            <a:endParaRPr/>
+            <a:endParaRPr dirty="0"/>
           </a:p>
         </p:txBody>
       </p:sp>
@@ -20126,14 +20603,30 @@
           <a:p>
             <a:r>
               <a:rPr lang="fr-FR" dirty="0"/>
-              <a:t>Introduction de l'argument positionnel optionnel 'mode' lors de l'ouverture d'un fichier.</a:t>
+              <a:t>Introduction de l'argument positionnel optionnel </a:t>
+            </a:r>
+            <a:r>
+              <a:rPr lang="fr-FR" b="1" dirty="0"/>
+              <a:t>'mode</a:t>
+            </a:r>
+            <a:r>
+              <a:rPr lang="fr-FR" dirty="0"/>
+              <a:t>' lors de l'ouverture d'un fichier.</a:t>
             </a:r>
             <a:endParaRPr lang="fr-FR" sz="1800" dirty="0"/>
           </a:p>
           <a:p>
             <a:r>
               <a:rPr lang="fr-FR" dirty="0"/>
-              <a:t>La valeur par défaut est 'r', pour l'ouverture en mode lecture seule.</a:t>
+              <a:t>La valeur par défaut est </a:t>
+            </a:r>
+            <a:r>
+              <a:rPr lang="fr-FR" b="1" dirty="0"/>
+              <a:t>'r</a:t>
+            </a:r>
+            <a:r>
+              <a:rPr lang="fr-FR" dirty="0"/>
+              <a:t>', pour l'ouverture en mode lecture seule.</a:t>
             </a:r>
           </a:p>
           <a:p>
@@ -20156,6 +20649,59 @@
               <a:ea typeface="Varela Round"/>
               <a:cs typeface="Varela Round"/>
               <a:sym typeface="Varela Round"/>
+            </a:endParaRPr>
+          </a:p>
+        </p:txBody>
+      </p:sp>
+      <p:sp>
+        <p:nvSpPr>
+          <p:cNvPr id="7" name="ZoneTexte 6"/>
+          <p:cNvSpPr txBox="1"/>
+          <p:nvPr/>
+        </p:nvSpPr>
+        <p:spPr>
+          <a:xfrm>
+            <a:off x="8046721" y="435127"/>
+            <a:ext cx="687376" cy="461665"/>
+          </a:xfrm>
+          <a:prstGeom prst="rect">
+            <a:avLst/>
+          </a:prstGeom>
+        </p:spPr>
+        <p:style>
+          <a:lnRef idx="2">
+            <a:schemeClr val="dk1">
+              <a:shade val="50000"/>
+            </a:schemeClr>
+          </a:lnRef>
+          <a:fillRef idx="1">
+            <a:schemeClr val="dk1"/>
+          </a:fillRef>
+          <a:effectRef idx="0">
+            <a:schemeClr val="dk1"/>
+          </a:effectRef>
+          <a:fontRef idx="minor">
+            <a:schemeClr val="lt1"/>
+          </a:fontRef>
+        </p:style>
+        <p:txBody>
+          <a:bodyPr wrap="square" rtlCol="0">
+            <a:spAutoFit/>
+          </a:bodyPr>
+          <a:lstStyle/>
+          <a:p>
+            <a:r>
+              <a:rPr lang="en-CA" sz="2400" dirty="0">
+                <a:solidFill>
+                  <a:schemeClr val="accent2"/>
+                </a:solidFill>
+              </a:rPr>
+              <a:t>17</a:t>
+            </a:r>
+            <a:endParaRPr lang="fr-FR" sz="2400" dirty="0">
+              <a:solidFill>
+                <a:schemeClr val="accent2"/>
+              </a:solidFill>
             </a:endParaRPr>
           </a:p>
         </p:txBody>
@@ -20255,7 +20801,7 @@
                 </a:spcAft>
                 <a:buNone/>
               </a:pPr>
-              <a:endParaRPr/>
+              <a:endParaRPr dirty="0"/>
             </a:p>
           </p:txBody>
         </p:sp>
@@ -20308,7 +20854,7 @@
                 </a:spcAft>
                 <a:buNone/>
               </a:pPr>
-              <a:endParaRPr/>
+              <a:endParaRPr dirty="0"/>
             </a:p>
           </p:txBody>
         </p:sp>
@@ -20378,7 +20924,7 @@
                 </a:spcAft>
                 <a:buNone/>
               </a:pPr>
-              <a:endParaRPr/>
+              <a:endParaRPr dirty="0"/>
             </a:p>
           </p:txBody>
         </p:sp>
@@ -20431,7 +20977,7 @@
                 </a:spcAft>
                 <a:buNone/>
               </a:pPr>
-              <a:endParaRPr/>
+              <a:endParaRPr dirty="0"/>
             </a:p>
           </p:txBody>
         </p:sp>
@@ -20501,7 +21047,7 @@
                 </a:spcAft>
                 <a:buNone/>
               </a:pPr>
-              <a:endParaRPr/>
+              <a:endParaRPr dirty="0"/>
             </a:p>
           </p:txBody>
         </p:sp>
@@ -20554,7 +21100,7 @@
                 </a:spcAft>
                 <a:buNone/>
               </a:pPr>
-              <a:endParaRPr/>
+              <a:endParaRPr dirty="0"/>
             </a:p>
           </p:txBody>
         </p:sp>
@@ -20624,7 +21170,7 @@
                 </a:spcAft>
                 <a:buNone/>
               </a:pPr>
-              <a:endParaRPr/>
+              <a:endParaRPr dirty="0"/>
             </a:p>
           </p:txBody>
         </p:sp>
@@ -20677,7 +21223,7 @@
                 </a:spcAft>
                 <a:buNone/>
               </a:pPr>
-              <a:endParaRPr/>
+              <a:endParaRPr dirty="0"/>
             </a:p>
           </p:txBody>
         </p:sp>
@@ -20726,47 +21272,7 @@
                 <a:effectLst/>
                 <a:latin typeface="Helvetica Neue"/>
               </a:rPr>
-              <a:t> </a:t>
-            </a:r>
-            <a:r>
-              <a:rPr lang="en-US" sz="1800" b="1" i="0" dirty="0" err="1">
-                <a:solidFill>
-                  <a:srgbClr val="000000"/>
-                </a:solidFill>
-                <a:effectLst/>
-                <a:latin typeface="Helvetica Neue"/>
-              </a:rPr>
-              <a:t>qu'un</a:t>
-            </a:r>
-            <a:r>
-              <a:rPr lang="en-US" sz="1800" b="1" i="0" dirty="0">
-                <a:solidFill>
-                  <a:srgbClr val="000000"/>
-                </a:solidFill>
-                <a:effectLst/>
-                <a:latin typeface="Helvetica Neue"/>
-              </a:rPr>
-              <a:t> </a:t>
-            </a:r>
-            <a:r>
-              <a:rPr lang="en-US" sz="1800" b="1" i="0" dirty="0" err="1">
-                <a:solidFill>
-                  <a:srgbClr val="000000"/>
-                </a:solidFill>
-                <a:effectLst/>
-                <a:latin typeface="Helvetica Neue"/>
-              </a:rPr>
-              <a:t>Fichier</a:t>
-            </a:r>
-            <a:r>
-              <a:rPr lang="en-US" sz="1800" b="1" i="0" dirty="0">
-                <a:solidFill>
-                  <a:srgbClr val="000000"/>
-                </a:solidFill>
-                <a:effectLst/>
-                <a:latin typeface="Helvetica Neue"/>
-              </a:rPr>
-              <a:t> ?</a:t>
+              <a:t> queue Fishier ?</a:t>
             </a:r>
             <a:endParaRPr sz="1800" dirty="0"/>
           </a:p>
@@ -20852,7 +21358,7 @@
               <a:rPr lang="en"/>
               <a:t>01</a:t>
             </a:r>
-            <a:endParaRPr/>
+            <a:endParaRPr dirty="0"/>
           </a:p>
         </p:txBody>
       </p:sp>
@@ -20933,7 +21439,7 @@
               <a:rPr lang="en"/>
               <a:t>02</a:t>
             </a:r>
-            <a:endParaRPr/>
+            <a:endParaRPr dirty="0"/>
           </a:p>
         </p:txBody>
       </p:sp>
@@ -21164,7 +21670,7 @@
                 </a:spcAft>
                 <a:buNone/>
               </a:pPr>
-              <a:endParaRPr/>
+              <a:endParaRPr dirty="0"/>
             </a:p>
           </p:txBody>
         </p:sp>
@@ -21217,7 +21723,7 @@
                 </a:spcAft>
                 <a:buNone/>
               </a:pPr>
-              <a:endParaRPr/>
+              <a:endParaRPr dirty="0"/>
             </a:p>
           </p:txBody>
         </p:sp>
@@ -21854,7 +22360,7 @@
                 </a:spcAft>
                 <a:buNone/>
               </a:pPr>
-              <a:endParaRPr/>
+              <a:endParaRPr dirty="0"/>
             </a:p>
           </p:txBody>
         </p:sp>
@@ -21907,7 +22413,7 @@
                 </a:spcAft>
                 <a:buNone/>
               </a:pPr>
-              <a:endParaRPr/>
+              <a:endParaRPr dirty="0"/>
             </a:p>
           </p:txBody>
         </p:sp>
@@ -22476,6 +22982,59 @@
               <a:rPr lang="en" dirty="0"/>
               <a:t>06</a:t>
             </a:r>
+          </a:p>
+        </p:txBody>
+      </p:sp>
+      <p:sp>
+        <p:nvSpPr>
+          <p:cNvPr id="38" name="ZoneTexte 37"/>
+          <p:cNvSpPr txBox="1"/>
+          <p:nvPr/>
+        </p:nvSpPr>
+        <p:spPr>
+          <a:xfrm>
+            <a:off x="8561510" y="447739"/>
+            <a:ext cx="340536" cy="461665"/>
+          </a:xfrm>
+          <a:prstGeom prst="rect">
+            <a:avLst/>
+          </a:prstGeom>
+        </p:spPr>
+        <p:style>
+          <a:lnRef idx="2">
+            <a:schemeClr val="dk1">
+              <a:shade val="50000"/>
+            </a:schemeClr>
+          </a:lnRef>
+          <a:fillRef idx="1">
+            <a:schemeClr val="dk1"/>
+          </a:fillRef>
+          <a:effectRef idx="0">
+            <a:schemeClr val="dk1"/>
+          </a:effectRef>
+          <a:fontRef idx="minor">
+            <a:schemeClr val="lt1"/>
+          </a:fontRef>
+        </p:style>
+        <p:txBody>
+          <a:bodyPr wrap="square" rtlCol="0">
+            <a:spAutoFit/>
+          </a:bodyPr>
+          <a:lstStyle/>
+          <a:p>
+            <a:r>
+              <a:rPr lang="en-CA" sz="2400" dirty="0">
+                <a:solidFill>
+                  <a:schemeClr val="accent2"/>
+                </a:solidFill>
+              </a:rPr>
+              <a:t>2</a:t>
+            </a:r>
+            <a:endParaRPr lang="fr-FR" sz="2400" dirty="0">
+              <a:solidFill>
+                <a:schemeClr val="accent2"/>
+              </a:solidFill>
+            </a:endParaRPr>
           </a:p>
         </p:txBody>
       </p:sp>
@@ -22590,7 +23149,7 @@
               <a:t>L'utilisation de « </a:t>
             </a:r>
             <a:r>
-              <a:rPr lang="fr-FR" sz="2400" dirty="0" err="1"/>
+              <a:rPr lang="fr-FR" sz="2400" b="1" dirty="0"/>
               <a:t>with</a:t>
             </a:r>
             <a:r>
@@ -22607,6 +23166,59 @@
               <a:rPr lang="fr-FR" sz="2400" dirty="0"/>
               <a:t>Les modes d'ouverture offrent une flexibilité pour différents scénarios d'utilisation des fichiers.</a:t>
             </a:r>
+          </a:p>
+        </p:txBody>
+      </p:sp>
+      <p:sp>
+        <p:nvSpPr>
+          <p:cNvPr id="4" name="ZoneTexte 3"/>
+          <p:cNvSpPr txBox="1"/>
+          <p:nvPr/>
+        </p:nvSpPr>
+        <p:spPr>
+          <a:xfrm>
+            <a:off x="8046721" y="435127"/>
+            <a:ext cx="687376" cy="461665"/>
+          </a:xfrm>
+          <a:prstGeom prst="rect">
+            <a:avLst/>
+          </a:prstGeom>
+        </p:spPr>
+        <p:style>
+          <a:lnRef idx="2">
+            <a:schemeClr val="dk1">
+              <a:shade val="50000"/>
+            </a:schemeClr>
+          </a:lnRef>
+          <a:fillRef idx="1">
+            <a:schemeClr val="dk1"/>
+          </a:fillRef>
+          <a:effectRef idx="0">
+            <a:schemeClr val="dk1"/>
+          </a:effectRef>
+          <a:fontRef idx="minor">
+            <a:schemeClr val="lt1"/>
+          </a:fontRef>
+        </p:style>
+        <p:txBody>
+          <a:bodyPr wrap="square" rtlCol="0">
+            <a:spAutoFit/>
+          </a:bodyPr>
+          <a:lstStyle/>
+          <a:p>
+            <a:r>
+              <a:rPr lang="en-CA" sz="2400" dirty="0">
+                <a:solidFill>
+                  <a:schemeClr val="accent2"/>
+                </a:solidFill>
+              </a:rPr>
+              <a:t>19</a:t>
+            </a:r>
+            <a:endParaRPr lang="fr-FR" sz="2400" dirty="0">
+              <a:solidFill>
+                <a:schemeClr val="accent2"/>
+              </a:solidFill>
+            </a:endParaRPr>
           </a:p>
         </p:txBody>
       </p:sp>
@@ -22738,7 +23350,7 @@
                 </a:spcAft>
                 <a:buNone/>
               </a:pPr>
-              <a:endParaRPr/>
+              <a:endParaRPr dirty="0"/>
             </a:p>
           </p:txBody>
         </p:sp>
@@ -22791,7 +23403,7 @@
                 </a:spcAft>
                 <a:buNone/>
               </a:pPr>
-              <a:endParaRPr/>
+              <a:endParaRPr dirty="0"/>
             </a:p>
           </p:txBody>
         </p:sp>
@@ -22887,7 +23499,7 @@
               </a:spcAft>
               <a:buNone/>
             </a:pPr>
-            <a:endParaRPr/>
+            <a:endParaRPr dirty="0"/>
           </a:p>
         </p:txBody>
       </p:sp>
@@ -22936,6 +23548,59 @@
               <a:t>Lecture des Fichiers</a:t>
             </a:r>
             <a:endParaRPr lang="fr-FR" sz="2800" dirty="0"/>
+          </a:p>
+        </p:txBody>
+      </p:sp>
+      <p:sp>
+        <p:nvSpPr>
+          <p:cNvPr id="9" name="ZoneTexte 8"/>
+          <p:cNvSpPr txBox="1"/>
+          <p:nvPr/>
+        </p:nvSpPr>
+        <p:spPr>
+          <a:xfrm>
+            <a:off x="8046721" y="435127"/>
+            <a:ext cx="687376" cy="461665"/>
+          </a:xfrm>
+          <a:prstGeom prst="rect">
+            <a:avLst/>
+          </a:prstGeom>
+        </p:spPr>
+        <p:style>
+          <a:lnRef idx="2">
+            <a:schemeClr val="dk1">
+              <a:shade val="50000"/>
+            </a:schemeClr>
+          </a:lnRef>
+          <a:fillRef idx="1">
+            <a:schemeClr val="dk1"/>
+          </a:fillRef>
+          <a:effectRef idx="0">
+            <a:schemeClr val="dk1"/>
+          </a:effectRef>
+          <a:fontRef idx="minor">
+            <a:schemeClr val="lt1"/>
+          </a:fontRef>
+        </p:style>
+        <p:txBody>
+          <a:bodyPr wrap="square" rtlCol="0">
+            <a:spAutoFit/>
+          </a:bodyPr>
+          <a:lstStyle/>
+          <a:p>
+            <a:r>
+              <a:rPr lang="en-CA" sz="2400" dirty="0">
+                <a:solidFill>
+                  <a:schemeClr val="accent2"/>
+                </a:solidFill>
+              </a:rPr>
+              <a:t>20</a:t>
+            </a:r>
+            <a:endParaRPr lang="fr-FR" sz="2400" dirty="0">
+              <a:solidFill>
+                <a:schemeClr val="accent2"/>
+              </a:solidFill>
+            </a:endParaRPr>
           </a:p>
         </p:txBody>
       </p:sp>
@@ -23018,7 +23683,7 @@
               </a:spcAft>
               <a:buNone/>
             </a:pPr>
-            <a:endParaRPr/>
+            <a:endParaRPr dirty="0"/>
           </a:p>
         </p:txBody>
       </p:sp>
@@ -23145,6 +23810,59 @@
               <a:t>Plusieurs méthodes sur un objet fichier sont disponibles pour faciliter la lecture.</a:t>
             </a:r>
             <a:endParaRPr sz="2000" dirty="0"/>
+          </a:p>
+        </p:txBody>
+      </p:sp>
+      <p:sp>
+        <p:nvSpPr>
+          <p:cNvPr id="4" name="ZoneTexte 3"/>
+          <p:cNvSpPr txBox="1"/>
+          <p:nvPr/>
+        </p:nvSpPr>
+        <p:spPr>
+          <a:xfrm>
+            <a:off x="8046721" y="435127"/>
+            <a:ext cx="687376" cy="461665"/>
+          </a:xfrm>
+          <a:prstGeom prst="rect">
+            <a:avLst/>
+          </a:prstGeom>
+        </p:spPr>
+        <p:style>
+          <a:lnRef idx="2">
+            <a:schemeClr val="dk1">
+              <a:shade val="50000"/>
+            </a:schemeClr>
+          </a:lnRef>
+          <a:fillRef idx="1">
+            <a:schemeClr val="dk1"/>
+          </a:fillRef>
+          <a:effectRef idx="0">
+            <a:schemeClr val="dk1"/>
+          </a:effectRef>
+          <a:fontRef idx="minor">
+            <a:schemeClr val="lt1"/>
+          </a:fontRef>
+        </p:style>
+        <p:txBody>
+          <a:bodyPr wrap="square" rtlCol="0">
+            <a:spAutoFit/>
+          </a:bodyPr>
+          <a:lstStyle/>
+          <a:p>
+            <a:r>
+              <a:rPr lang="en-CA" sz="2400" dirty="0">
+                <a:solidFill>
+                  <a:schemeClr val="accent2"/>
+                </a:solidFill>
+              </a:rPr>
+              <a:t>21</a:t>
+            </a:r>
+            <a:endParaRPr lang="fr-FR" sz="2400" dirty="0">
+              <a:solidFill>
+                <a:schemeClr val="accent2"/>
+              </a:solidFill>
+            </a:endParaRPr>
           </a:p>
         </p:txBody>
       </p:sp>
@@ -23227,7 +23945,7 @@
               </a:spcAft>
               <a:buNone/>
             </a:pPr>
-            <a:endParaRPr/>
+            <a:endParaRPr dirty="0"/>
           </a:p>
         </p:txBody>
       </p:sp>
@@ -23591,6 +24309,59 @@
           </a:prstGeom>
         </p:spPr>
       </p:pic>
+      <p:sp>
+        <p:nvSpPr>
+          <p:cNvPr id="7" name="ZoneTexte 6"/>
+          <p:cNvSpPr txBox="1"/>
+          <p:nvPr/>
+        </p:nvSpPr>
+        <p:spPr>
+          <a:xfrm>
+            <a:off x="8046721" y="435127"/>
+            <a:ext cx="687376" cy="461665"/>
+          </a:xfrm>
+          <a:prstGeom prst="rect">
+            <a:avLst/>
+          </a:prstGeom>
+        </p:spPr>
+        <p:style>
+          <a:lnRef idx="2">
+            <a:schemeClr val="dk1">
+              <a:shade val="50000"/>
+            </a:schemeClr>
+          </a:lnRef>
+          <a:fillRef idx="1">
+            <a:schemeClr val="dk1"/>
+          </a:fillRef>
+          <a:effectRef idx="0">
+            <a:schemeClr val="dk1"/>
+          </a:effectRef>
+          <a:fontRef idx="minor">
+            <a:schemeClr val="lt1"/>
+          </a:fontRef>
+        </p:style>
+        <p:txBody>
+          <a:bodyPr wrap="square" rtlCol="0">
+            <a:spAutoFit/>
+          </a:bodyPr>
+          <a:lstStyle/>
+          <a:p>
+            <a:r>
+              <a:rPr lang="en-CA" sz="2400" dirty="0">
+                <a:solidFill>
+                  <a:schemeClr val="accent2"/>
+                </a:solidFill>
+              </a:rPr>
+              <a:t>22</a:t>
+            </a:r>
+            <a:endParaRPr lang="fr-FR" sz="2400" dirty="0">
+              <a:solidFill>
+                <a:schemeClr val="accent2"/>
+              </a:solidFill>
+            </a:endParaRPr>
+          </a:p>
+        </p:txBody>
+      </p:sp>
     </p:spTree>
     <p:extLst>
       <p:ext uri="{BB962C8B-B14F-4D97-AF65-F5344CB8AC3E}">
@@ -23670,7 +24441,7 @@
               </a:spcAft>
               <a:buNone/>
             </a:pPr>
-            <a:endParaRPr/>
+            <a:endParaRPr dirty="0"/>
           </a:p>
         </p:txBody>
       </p:sp>
@@ -24021,15 +24792,7 @@
             </a:pPr>
             <a:r>
               <a:rPr lang="fr-FR" sz="1600" b="1" dirty="0"/>
-              <a:t>Exemple utilisant « .</a:t>
-            </a:r>
-            <a:r>
-              <a:rPr lang="fr-FR" sz="1600" b="1" dirty="0" err="1"/>
-              <a:t>read</a:t>
-            </a:r>
-            <a:r>
-              <a:rPr lang="fr-FR" sz="1600" b="1" dirty="0"/>
-              <a:t>() » pour lire et imprimer le fichier entier.</a:t>
+              <a:t>Exemple utilisant « .Read() » pour lire et imprimer le fichier entier.</a:t>
             </a:r>
           </a:p>
         </p:txBody>
@@ -24057,6 +24820,59 @@
           </a:prstGeom>
         </p:spPr>
       </p:pic>
+      <p:sp>
+        <p:nvSpPr>
+          <p:cNvPr id="7" name="ZoneTexte 6"/>
+          <p:cNvSpPr txBox="1"/>
+          <p:nvPr/>
+        </p:nvSpPr>
+        <p:spPr>
+          <a:xfrm>
+            <a:off x="8046721" y="435127"/>
+            <a:ext cx="687376" cy="461665"/>
+          </a:xfrm>
+          <a:prstGeom prst="rect">
+            <a:avLst/>
+          </a:prstGeom>
+        </p:spPr>
+        <p:style>
+          <a:lnRef idx="2">
+            <a:schemeClr val="dk1">
+              <a:shade val="50000"/>
+            </a:schemeClr>
+          </a:lnRef>
+          <a:fillRef idx="1">
+            <a:schemeClr val="dk1"/>
+          </a:fillRef>
+          <a:effectRef idx="0">
+            <a:schemeClr val="dk1"/>
+          </a:effectRef>
+          <a:fontRef idx="minor">
+            <a:schemeClr val="lt1"/>
+          </a:fontRef>
+        </p:style>
+        <p:txBody>
+          <a:bodyPr wrap="square" rtlCol="0">
+            <a:spAutoFit/>
+          </a:bodyPr>
+          <a:lstStyle/>
+          <a:p>
+            <a:r>
+              <a:rPr lang="en-CA" sz="2400" dirty="0">
+                <a:solidFill>
+                  <a:schemeClr val="accent2"/>
+                </a:solidFill>
+              </a:rPr>
+              <a:t>23</a:t>
+            </a:r>
+            <a:endParaRPr lang="fr-FR" sz="2400" dirty="0">
+              <a:solidFill>
+                <a:schemeClr val="accent2"/>
+              </a:solidFill>
+            </a:endParaRPr>
+          </a:p>
+        </p:txBody>
+      </p:sp>
     </p:spTree>
     <p:extLst>
       <p:ext uri="{BB962C8B-B14F-4D97-AF65-F5344CB8AC3E}">
@@ -24136,7 +24952,7 @@
               </a:spcAft>
               <a:buNone/>
             </a:pPr>
-            <a:endParaRPr/>
+            <a:endParaRPr dirty="0"/>
           </a:p>
         </p:txBody>
       </p:sp>
@@ -24178,31 +24994,7 @@
                 <a:cs typeface="Varela Round"/>
                 <a:sym typeface="Varela Round"/>
               </a:rPr>
-              <a:t>Utilisation de « .</a:t>
-            </a:r>
-            <a:r>
-              <a:rPr lang="fr-FR" sz="1800" b="1" dirty="0" err="1">
-                <a:solidFill>
-                  <a:schemeClr val="dk1"/>
-                </a:solidFill>
-                <a:latin typeface="Varela Round"/>
-                <a:ea typeface="Varela Round"/>
-                <a:cs typeface="Varela Round"/>
-                <a:sym typeface="Varela Round"/>
-              </a:rPr>
-              <a:t>readline</a:t>
-            </a:r>
-            <a:r>
-              <a:rPr lang="fr-FR" sz="1800" b="1" dirty="0">
-                <a:solidFill>
-                  <a:schemeClr val="dk1"/>
-                </a:solidFill>
-                <a:latin typeface="Varela Round"/>
-                <a:ea typeface="Varela Round"/>
-                <a:cs typeface="Varela Round"/>
-                <a:sym typeface="Varela Round"/>
-              </a:rPr>
-              <a:t>() »</a:t>
+              <a:t>Utilisation de « .readlines() »</a:t>
             </a:r>
           </a:p>
         </p:txBody>
@@ -24253,6 +25045,59 @@
           </a:prstGeom>
         </p:spPr>
       </p:pic>
+      <p:sp>
+        <p:nvSpPr>
+          <p:cNvPr id="6" name="ZoneTexte 5"/>
+          <p:cNvSpPr txBox="1"/>
+          <p:nvPr/>
+        </p:nvSpPr>
+        <p:spPr>
+          <a:xfrm>
+            <a:off x="8046721" y="435127"/>
+            <a:ext cx="687376" cy="461665"/>
+          </a:xfrm>
+          <a:prstGeom prst="rect">
+            <a:avLst/>
+          </a:prstGeom>
+        </p:spPr>
+        <p:style>
+          <a:lnRef idx="2">
+            <a:schemeClr val="dk1">
+              <a:shade val="50000"/>
+            </a:schemeClr>
+          </a:lnRef>
+          <a:fillRef idx="1">
+            <a:schemeClr val="dk1"/>
+          </a:fillRef>
+          <a:effectRef idx="0">
+            <a:schemeClr val="dk1"/>
+          </a:effectRef>
+          <a:fontRef idx="minor">
+            <a:schemeClr val="lt1"/>
+          </a:fontRef>
+        </p:style>
+        <p:txBody>
+          <a:bodyPr wrap="square" rtlCol="0">
+            <a:spAutoFit/>
+          </a:bodyPr>
+          <a:lstStyle/>
+          <a:p>
+            <a:r>
+              <a:rPr lang="en-CA" sz="2400" dirty="0">
+                <a:solidFill>
+                  <a:schemeClr val="accent2"/>
+                </a:solidFill>
+              </a:rPr>
+              <a:t>24</a:t>
+            </a:r>
+            <a:endParaRPr lang="fr-FR" sz="2400" dirty="0">
+              <a:solidFill>
+                <a:schemeClr val="accent2"/>
+              </a:solidFill>
+            </a:endParaRPr>
+          </a:p>
+        </p:txBody>
+      </p:sp>
     </p:spTree>
     <p:extLst>
       <p:ext uri="{BB962C8B-B14F-4D97-AF65-F5344CB8AC3E}">
@@ -24332,7 +25177,7 @@
               </a:spcAft>
               <a:buNone/>
             </a:pPr>
-            <a:endParaRPr/>
+            <a:endParaRPr dirty="0"/>
           </a:p>
         </p:txBody>
       </p:sp>
@@ -24374,31 +25219,7 @@
                 <a:cs typeface="Varela Round"/>
                 <a:sym typeface="Varela Round"/>
               </a:rPr>
-              <a:t>Utilisation de « .</a:t>
-            </a:r>
-            <a:r>
-              <a:rPr lang="fr-FR" sz="1800" b="1" dirty="0" err="1">
-                <a:solidFill>
-                  <a:schemeClr val="dk1"/>
-                </a:solidFill>
-                <a:latin typeface="Varela Round"/>
-                <a:ea typeface="Varela Round"/>
-                <a:cs typeface="Varela Round"/>
-                <a:sym typeface="Varela Round"/>
-              </a:rPr>
-              <a:t>readlines</a:t>
-            </a:r>
-            <a:r>
-              <a:rPr lang="fr-FR" sz="1800" b="1" dirty="0">
-                <a:solidFill>
-                  <a:schemeClr val="dk1"/>
-                </a:solidFill>
-                <a:latin typeface="Varela Round"/>
-                <a:ea typeface="Varela Round"/>
-                <a:cs typeface="Varela Round"/>
-                <a:sym typeface="Varela Round"/>
-              </a:rPr>
-              <a:t>() »</a:t>
+              <a:t>Utilisation de « .readlines() »</a:t>
             </a:r>
           </a:p>
         </p:txBody>
@@ -24715,23 +25536,83 @@
           </a:p>
         </p:txBody>
       </p:sp>
+      <p:sp>
+        <p:nvSpPr>
+          <p:cNvPr id="7" name="ZoneTexte 6"/>
+          <p:cNvSpPr txBox="1"/>
+          <p:nvPr/>
+        </p:nvSpPr>
+        <p:spPr>
+          <a:xfrm>
+            <a:off x="8046721" y="435127"/>
+            <a:ext cx="687376" cy="461665"/>
+          </a:xfrm>
+          <a:prstGeom prst="rect">
+            <a:avLst/>
+          </a:prstGeom>
+        </p:spPr>
+        <p:style>
+          <a:lnRef idx="2">
+            <a:schemeClr val="dk1">
+              <a:shade val="50000"/>
+            </a:schemeClr>
+          </a:lnRef>
+          <a:fillRef idx="1">
+            <a:schemeClr val="dk1"/>
+          </a:fillRef>
+          <a:effectRef idx="0">
+            <a:schemeClr val="dk1"/>
+          </a:effectRef>
+          <a:fontRef idx="minor">
+            <a:schemeClr val="lt1"/>
+          </a:fontRef>
+        </p:style>
+        <p:txBody>
+          <a:bodyPr wrap="square" rtlCol="0">
+            <a:spAutoFit/>
+          </a:bodyPr>
+          <a:lstStyle/>
+          <a:p>
+            <a:r>
+              <a:rPr lang="en-CA" sz="2400" dirty="0">
+                <a:solidFill>
+                  <a:schemeClr val="accent2"/>
+                </a:solidFill>
+              </a:rPr>
+              <a:t>25</a:t>
+            </a:r>
+            <a:endParaRPr lang="fr-FR" sz="2400" dirty="0">
+              <a:solidFill>
+                <a:schemeClr val="accent2"/>
+              </a:solidFill>
+            </a:endParaRPr>
+          </a:p>
+        </p:txBody>
+      </p:sp>
       <p:pic>
         <p:nvPicPr>
-          <p:cNvPr id="6" name="Picture 5"/>
+          <p:cNvPr id="4" name="Image 3">
+            <a:extLst>
+              <a:ext uri="{FF2B5EF4-FFF2-40B4-BE49-F238E27FC236}">
+                <a16:creationId xmlns:a16="http://schemas.microsoft.com/office/drawing/2014/main" id="{D6C1AEB3-CF0A-1244-B554-DA0FF92503A7}"/>
+              </a:ext>
+            </a:extLst>
+          </p:cNvPr>
           <p:cNvPicPr>
             <a:picLocks noChangeAspect="1"/>
           </p:cNvPicPr>
           <p:nvPr/>
         </p:nvPicPr>
-        <p:blipFill rotWithShape="1">
+        <p:blipFill>
           <a:blip r:embed="rId4"/>
-          <a:srcRect t="6539" b="31154"/>
-          <a:stretch/>
+          <a:stretch>
+            <a:fillRect/>
+          </a:stretch>
         </p:blipFill>
         <p:spPr>
           <a:xfrm>
-            <a:off x="1792605" y="3239006"/>
-            <a:ext cx="5493879" cy="731013"/>
+            <a:off x="1218953" y="3132327"/>
+            <a:ext cx="6270487" cy="1173859"/>
           </a:xfrm>
           <a:prstGeom prst="rect">
             <a:avLst/>
@@ -24857,6 +25738,59 @@
               <a:rPr lang="fr-FR" sz="2400" dirty="0"/>
               <a:t>L'itération directe sur l'objet fichier est recommandée pour sa simplicité et son efficacité.</a:t>
             </a:r>
+          </a:p>
+        </p:txBody>
+      </p:sp>
+      <p:sp>
+        <p:nvSpPr>
+          <p:cNvPr id="4" name="ZoneTexte 3"/>
+          <p:cNvSpPr txBox="1"/>
+          <p:nvPr/>
+        </p:nvSpPr>
+        <p:spPr>
+          <a:xfrm>
+            <a:off x="8046721" y="435127"/>
+            <a:ext cx="687376" cy="461665"/>
+          </a:xfrm>
+          <a:prstGeom prst="rect">
+            <a:avLst/>
+          </a:prstGeom>
+        </p:spPr>
+        <p:style>
+          <a:lnRef idx="2">
+            <a:schemeClr val="dk1">
+              <a:shade val="50000"/>
+            </a:schemeClr>
+          </a:lnRef>
+          <a:fillRef idx="1">
+            <a:schemeClr val="dk1"/>
+          </a:fillRef>
+          <a:effectRef idx="0">
+            <a:schemeClr val="dk1"/>
+          </a:effectRef>
+          <a:fontRef idx="minor">
+            <a:schemeClr val="lt1"/>
+          </a:fontRef>
+        </p:style>
+        <p:txBody>
+          <a:bodyPr wrap="square" rtlCol="0">
+            <a:spAutoFit/>
+          </a:bodyPr>
+          <a:lstStyle/>
+          <a:p>
+            <a:r>
+              <a:rPr lang="en-CA" sz="2400" dirty="0">
+                <a:solidFill>
+                  <a:schemeClr val="accent2"/>
+                </a:solidFill>
+              </a:rPr>
+              <a:t>26</a:t>
+            </a:r>
+            <a:endParaRPr lang="fr-FR" sz="2400" dirty="0">
+              <a:solidFill>
+                <a:schemeClr val="accent2"/>
+              </a:solidFill>
+            </a:endParaRPr>
           </a:p>
         </p:txBody>
       </p:sp>
@@ -24988,7 +25922,7 @@
                 </a:spcAft>
                 <a:buNone/>
               </a:pPr>
-              <a:endParaRPr/>
+              <a:endParaRPr dirty="0"/>
             </a:p>
           </p:txBody>
         </p:sp>
@@ -25041,7 +25975,7 @@
                 </a:spcAft>
                 <a:buNone/>
               </a:pPr>
-              <a:endParaRPr/>
+              <a:endParaRPr dirty="0"/>
             </a:p>
           </p:txBody>
         </p:sp>
@@ -25137,7 +26071,7 @@
               </a:spcAft>
               <a:buNone/>
             </a:pPr>
-            <a:endParaRPr/>
+            <a:endParaRPr dirty="0"/>
           </a:p>
         </p:txBody>
       </p:sp>
@@ -25177,6 +26111,59 @@
               <a:t>Écriture des fichiers</a:t>
             </a:r>
             <a:endParaRPr lang="fr-FR" sz="2800" dirty="0"/>
+          </a:p>
+        </p:txBody>
+      </p:sp>
+      <p:sp>
+        <p:nvSpPr>
+          <p:cNvPr id="9" name="ZoneTexte 8"/>
+          <p:cNvSpPr txBox="1"/>
+          <p:nvPr/>
+        </p:nvSpPr>
+        <p:spPr>
+          <a:xfrm>
+            <a:off x="8046721" y="435127"/>
+            <a:ext cx="687376" cy="461665"/>
+          </a:xfrm>
+          <a:prstGeom prst="rect">
+            <a:avLst/>
+          </a:prstGeom>
+        </p:spPr>
+        <p:style>
+          <a:lnRef idx="2">
+            <a:schemeClr val="dk1">
+              <a:shade val="50000"/>
+            </a:schemeClr>
+          </a:lnRef>
+          <a:fillRef idx="1">
+            <a:schemeClr val="dk1"/>
+          </a:fillRef>
+          <a:effectRef idx="0">
+            <a:schemeClr val="dk1"/>
+          </a:effectRef>
+          <a:fontRef idx="minor">
+            <a:schemeClr val="lt1"/>
+          </a:fontRef>
+        </p:style>
+        <p:txBody>
+          <a:bodyPr wrap="square" rtlCol="0">
+            <a:spAutoFit/>
+          </a:bodyPr>
+          <a:lstStyle/>
+          <a:p>
+            <a:r>
+              <a:rPr lang="en-CA" sz="2400" dirty="0">
+                <a:solidFill>
+                  <a:schemeClr val="accent2"/>
+                </a:solidFill>
+              </a:rPr>
+              <a:t>27</a:t>
+            </a:r>
+            <a:endParaRPr lang="fr-FR" sz="2400" dirty="0">
+              <a:solidFill>
+                <a:schemeClr val="accent2"/>
+              </a:solidFill>
+            </a:endParaRPr>
           </a:p>
         </p:txBody>
       </p:sp>
@@ -25259,7 +26246,7 @@
               </a:spcAft>
               <a:buNone/>
             </a:pPr>
-            <a:endParaRPr/>
+            <a:endParaRPr dirty="0"/>
           </a:p>
         </p:txBody>
       </p:sp>
@@ -25383,10 +26370,10 @@
                   <a:noFill/>
                 </a:uFill>
               </a:rPr>
-              <a:t>Les objets fichier offrent des méthodes telles que « .</a:t>
+              <a:t>Les objets fichier offrent des méthodes telles que «</a:t>
             </a:r>
             <a:r>
-              <a:rPr lang="fr-FR" sz="2000" dirty="0" err="1">
+              <a:rPr lang="fr-FR" sz="2000" b="1" dirty="0">
                 <a:solidFill>
                   <a:schemeClr val="hlink"/>
                 </a:solidFill>
@@ -25394,7 +26381,7 @@
                   <a:noFill/>
                 </a:uFill>
               </a:rPr>
-              <a:t>write</a:t>
+              <a:t> .write()</a:t>
             </a:r>
             <a:r>
               <a:rPr lang="fr-FR" sz="2000" dirty="0">
@@ -25405,10 +26392,10 @@
                   <a:noFill/>
                 </a:uFill>
               </a:rPr>
-              <a:t>() » et « .</a:t>
+              <a:t> » et « </a:t>
             </a:r>
             <a:r>
-              <a:rPr lang="fr-FR" sz="2000" dirty="0" err="1">
+              <a:rPr lang="fr-FR" sz="2000" b="1" dirty="0">
                 <a:solidFill>
                   <a:schemeClr val="hlink"/>
                 </a:solidFill>
@@ -25416,7 +26403,7 @@
                   <a:noFill/>
                 </a:uFill>
               </a:rPr>
-              <a:t>writelines</a:t>
+              <a:t>.writelines()</a:t>
             </a:r>
             <a:r>
               <a:rPr lang="fr-FR" sz="2000" dirty="0">
@@ -25427,9 +26414,62 @@
                   <a:noFill/>
                 </a:uFill>
               </a:rPr>
-              <a:t>() ».</a:t>
+              <a:t> ».</a:t>
             </a:r>
             <a:endParaRPr sz="2000" dirty="0"/>
+          </a:p>
+        </p:txBody>
+      </p:sp>
+      <p:sp>
+        <p:nvSpPr>
+          <p:cNvPr id="4" name="ZoneTexte 3"/>
+          <p:cNvSpPr txBox="1"/>
+          <p:nvPr/>
+        </p:nvSpPr>
+        <p:spPr>
+          <a:xfrm>
+            <a:off x="8046721" y="435127"/>
+            <a:ext cx="687376" cy="461665"/>
+          </a:xfrm>
+          <a:prstGeom prst="rect">
+            <a:avLst/>
+          </a:prstGeom>
+        </p:spPr>
+        <p:style>
+          <a:lnRef idx="2">
+            <a:schemeClr val="dk1">
+              <a:shade val="50000"/>
+            </a:schemeClr>
+          </a:lnRef>
+          <a:fillRef idx="1">
+            <a:schemeClr val="dk1"/>
+          </a:fillRef>
+          <a:effectRef idx="0">
+            <a:schemeClr val="dk1"/>
+          </a:effectRef>
+          <a:fontRef idx="minor">
+            <a:schemeClr val="lt1"/>
+          </a:fontRef>
+        </p:style>
+        <p:txBody>
+          <a:bodyPr wrap="square" rtlCol="0">
+            <a:spAutoFit/>
+          </a:bodyPr>
+          <a:lstStyle/>
+          <a:p>
+            <a:r>
+              <a:rPr lang="en-CA" sz="2400" dirty="0">
+                <a:solidFill>
+                  <a:schemeClr val="accent2"/>
+                </a:solidFill>
+              </a:rPr>
+              <a:t>28</a:t>
+            </a:r>
+            <a:endParaRPr lang="fr-FR" sz="2400" dirty="0">
+              <a:solidFill>
+                <a:schemeClr val="accent2"/>
+              </a:solidFill>
+            </a:endParaRPr>
           </a:p>
         </p:txBody>
       </p:sp>
@@ -25554,7 +26594,7 @@
                 </a:spcAft>
                 <a:buNone/>
               </a:pPr>
-              <a:endParaRPr/>
+              <a:endParaRPr dirty="0"/>
             </a:p>
           </p:txBody>
         </p:sp>
@@ -25607,7 +26647,7 @@
                 </a:spcAft>
                 <a:buNone/>
               </a:pPr>
-              <a:endParaRPr/>
+              <a:endParaRPr dirty="0"/>
             </a:p>
           </p:txBody>
         </p:sp>
@@ -25650,7 +26690,7 @@
               <a:rPr lang="en"/>
               <a:t>01</a:t>
             </a:r>
-            <a:endParaRPr/>
+            <a:endParaRPr dirty="0"/>
           </a:p>
         </p:txBody>
       </p:sp>
@@ -25703,7 +26743,7 @@
               </a:spcAft>
               <a:buNone/>
             </a:pPr>
-            <a:endParaRPr/>
+            <a:endParaRPr dirty="0"/>
           </a:p>
         </p:txBody>
       </p:sp>
@@ -25752,6 +26792,59 @@
               <a:t>Qu'est-ce qu'un Fichier ?</a:t>
             </a:r>
             <a:endParaRPr lang="fr-FR" sz="2800" dirty="0"/>
+          </a:p>
+        </p:txBody>
+      </p:sp>
+      <p:sp>
+        <p:nvSpPr>
+          <p:cNvPr id="9" name="ZoneTexte 8"/>
+          <p:cNvSpPr txBox="1"/>
+          <p:nvPr/>
+        </p:nvSpPr>
+        <p:spPr>
+          <a:xfrm>
+            <a:off x="8633197" y="435127"/>
+            <a:ext cx="340536" cy="461665"/>
+          </a:xfrm>
+          <a:prstGeom prst="rect">
+            <a:avLst/>
+          </a:prstGeom>
+        </p:spPr>
+        <p:style>
+          <a:lnRef idx="2">
+            <a:schemeClr val="dk1">
+              <a:shade val="50000"/>
+            </a:schemeClr>
+          </a:lnRef>
+          <a:fillRef idx="1">
+            <a:schemeClr val="dk1"/>
+          </a:fillRef>
+          <a:effectRef idx="0">
+            <a:schemeClr val="dk1"/>
+          </a:effectRef>
+          <a:fontRef idx="minor">
+            <a:schemeClr val="lt1"/>
+          </a:fontRef>
+        </p:style>
+        <p:txBody>
+          <a:bodyPr wrap="square" rtlCol="0">
+            <a:spAutoFit/>
+          </a:bodyPr>
+          <a:lstStyle/>
+          <a:p>
+            <a:r>
+              <a:rPr lang="en-CA" sz="2400" dirty="0">
+                <a:solidFill>
+                  <a:schemeClr val="accent2"/>
+                </a:solidFill>
+              </a:rPr>
+              <a:t>3</a:t>
+            </a:r>
+            <a:endParaRPr lang="fr-FR" sz="2400" dirty="0">
+              <a:solidFill>
+                <a:schemeClr val="accent2"/>
+              </a:solidFill>
+            </a:endParaRPr>
           </a:p>
         </p:txBody>
       </p:sp>
@@ -25829,7 +26922,7 @@
               </a:spcAft>
               <a:buNone/>
             </a:pPr>
-            <a:endParaRPr/>
+            <a:endParaRPr dirty="0"/>
           </a:p>
         </p:txBody>
       </p:sp>
@@ -25946,6 +27039,59 @@
           </a:prstGeom>
         </p:spPr>
       </p:pic>
+      <p:sp>
+        <p:nvSpPr>
+          <p:cNvPr id="5" name="ZoneTexte 4"/>
+          <p:cNvSpPr txBox="1"/>
+          <p:nvPr/>
+        </p:nvSpPr>
+        <p:spPr>
+          <a:xfrm>
+            <a:off x="8046721" y="435127"/>
+            <a:ext cx="687376" cy="461665"/>
+          </a:xfrm>
+          <a:prstGeom prst="rect">
+            <a:avLst/>
+          </a:prstGeom>
+        </p:spPr>
+        <p:style>
+          <a:lnRef idx="2">
+            <a:schemeClr val="dk1">
+              <a:shade val="50000"/>
+            </a:schemeClr>
+          </a:lnRef>
+          <a:fillRef idx="1">
+            <a:schemeClr val="dk1"/>
+          </a:fillRef>
+          <a:effectRef idx="0">
+            <a:schemeClr val="dk1"/>
+          </a:effectRef>
+          <a:fontRef idx="minor">
+            <a:schemeClr val="lt1"/>
+          </a:fontRef>
+        </p:style>
+        <p:txBody>
+          <a:bodyPr wrap="square" rtlCol="0">
+            <a:spAutoFit/>
+          </a:bodyPr>
+          <a:lstStyle/>
+          <a:p>
+            <a:r>
+              <a:rPr lang="en-CA" sz="2400" dirty="0">
+                <a:solidFill>
+                  <a:schemeClr val="accent2"/>
+                </a:solidFill>
+              </a:rPr>
+              <a:t>29</a:t>
+            </a:r>
+            <a:endParaRPr lang="fr-FR" sz="2400" dirty="0">
+              <a:solidFill>
+                <a:schemeClr val="accent2"/>
+              </a:solidFill>
+            </a:endParaRPr>
+          </a:p>
+        </p:txBody>
+      </p:sp>
     </p:spTree>
     <p:extLst>
       <p:ext uri="{BB962C8B-B14F-4D97-AF65-F5344CB8AC3E}">
@@ -26025,7 +27171,7 @@
               </a:spcAft>
               <a:buNone/>
             </a:pPr>
-            <a:endParaRPr/>
+            <a:endParaRPr dirty="0"/>
           </a:p>
         </p:txBody>
       </p:sp>
@@ -26067,31 +27213,7 @@
                 <a:cs typeface="Varela Round"/>
                 <a:sym typeface="Varela Round"/>
               </a:rPr>
-              <a:t>Utilisation de « .</a:t>
-            </a:r>
-            <a:r>
-              <a:rPr lang="fr-FR" sz="1800" b="1" dirty="0" err="1">
-                <a:solidFill>
-                  <a:schemeClr val="dk1"/>
-                </a:solidFill>
-                <a:latin typeface="Varela Round"/>
-                <a:ea typeface="Varela Round"/>
-                <a:cs typeface="Varela Round"/>
-                <a:sym typeface="Varela Round"/>
-              </a:rPr>
-              <a:t>write</a:t>
-            </a:r>
-            <a:r>
-              <a:rPr lang="fr-FR" sz="1800" b="1" dirty="0">
-                <a:solidFill>
-                  <a:schemeClr val="dk1"/>
-                </a:solidFill>
-                <a:latin typeface="Varela Round"/>
-                <a:ea typeface="Varela Round"/>
-                <a:cs typeface="Varela Round"/>
-                <a:sym typeface="Varela Round"/>
-              </a:rPr>
-              <a:t>() »</a:t>
+              <a:t>Utilisation de « .write() »</a:t>
             </a:r>
           </a:p>
           <a:p>
@@ -26151,7 +27273,7 @@
               </a:spcAft>
               <a:buNone/>
             </a:pPr>
-            <a:endParaRPr/>
+            <a:endParaRPr dirty="0"/>
           </a:p>
         </p:txBody>
       </p:sp>
@@ -26472,6 +27594,59 @@
           </a:prstGeom>
         </p:spPr>
       </p:pic>
+      <p:sp>
+        <p:nvSpPr>
+          <p:cNvPr id="7" name="ZoneTexte 6"/>
+          <p:cNvSpPr txBox="1"/>
+          <p:nvPr/>
+        </p:nvSpPr>
+        <p:spPr>
+          <a:xfrm>
+            <a:off x="8078252" y="447567"/>
+            <a:ext cx="687376" cy="461665"/>
+          </a:xfrm>
+          <a:prstGeom prst="rect">
+            <a:avLst/>
+          </a:prstGeom>
+        </p:spPr>
+        <p:style>
+          <a:lnRef idx="2">
+            <a:schemeClr val="dk1">
+              <a:shade val="50000"/>
+            </a:schemeClr>
+          </a:lnRef>
+          <a:fillRef idx="1">
+            <a:schemeClr val="dk1"/>
+          </a:fillRef>
+          <a:effectRef idx="0">
+            <a:schemeClr val="dk1"/>
+          </a:effectRef>
+          <a:fontRef idx="minor">
+            <a:schemeClr val="lt1"/>
+          </a:fontRef>
+        </p:style>
+        <p:txBody>
+          <a:bodyPr wrap="square" rtlCol="0">
+            <a:spAutoFit/>
+          </a:bodyPr>
+          <a:lstStyle/>
+          <a:p>
+            <a:r>
+              <a:rPr lang="en-CA" sz="2400" dirty="0">
+                <a:solidFill>
+                  <a:schemeClr val="accent2"/>
+                </a:solidFill>
+              </a:rPr>
+              <a:t>30</a:t>
+            </a:r>
+            <a:endParaRPr lang="fr-FR" sz="2400" dirty="0">
+              <a:solidFill>
+                <a:schemeClr val="accent2"/>
+              </a:solidFill>
+            </a:endParaRPr>
+          </a:p>
+        </p:txBody>
+      </p:sp>
     </p:spTree>
     <p:extLst>
       <p:ext uri="{BB962C8B-B14F-4D97-AF65-F5344CB8AC3E}">
@@ -26551,7 +27726,7 @@
               </a:spcAft>
               <a:buNone/>
             </a:pPr>
-            <a:endParaRPr/>
+            <a:endParaRPr dirty="0"/>
           </a:p>
         </p:txBody>
       </p:sp>
@@ -26593,31 +27768,7 @@
                 <a:cs typeface="Varela Round"/>
                 <a:sym typeface="Varela Round"/>
               </a:rPr>
-              <a:t>Utilisation de « .</a:t>
-            </a:r>
-            <a:r>
-              <a:rPr lang="fr-FR" sz="1800" b="1" dirty="0" err="1">
-                <a:solidFill>
-                  <a:schemeClr val="dk1"/>
-                </a:solidFill>
-                <a:latin typeface="Varela Round"/>
-                <a:ea typeface="Varela Round"/>
-                <a:cs typeface="Varela Round"/>
-                <a:sym typeface="Varela Round"/>
-              </a:rPr>
-              <a:t>writelines</a:t>
-            </a:r>
-            <a:r>
-              <a:rPr lang="fr-FR" sz="1800" b="1" dirty="0">
-                <a:solidFill>
-                  <a:schemeClr val="dk1"/>
-                </a:solidFill>
-                <a:latin typeface="Varela Round"/>
-                <a:ea typeface="Varela Round"/>
-                <a:cs typeface="Varela Round"/>
-                <a:sym typeface="Varela Round"/>
-              </a:rPr>
-              <a:t>() »</a:t>
+              <a:t>Utilisation de « .writelines() »</a:t>
             </a:r>
           </a:p>
           <a:p>
@@ -26677,7 +27828,7 @@
               </a:spcAft>
               <a:buNone/>
             </a:pPr>
-            <a:endParaRPr/>
+            <a:endParaRPr dirty="0"/>
           </a:p>
         </p:txBody>
       </p:sp>
@@ -26998,6 +28149,59 @@
           </a:prstGeom>
         </p:spPr>
       </p:pic>
+      <p:sp>
+        <p:nvSpPr>
+          <p:cNvPr id="7" name="ZoneTexte 6"/>
+          <p:cNvSpPr txBox="1"/>
+          <p:nvPr/>
+        </p:nvSpPr>
+        <p:spPr>
+          <a:xfrm>
+            <a:off x="8046721" y="435127"/>
+            <a:ext cx="687376" cy="461665"/>
+          </a:xfrm>
+          <a:prstGeom prst="rect">
+            <a:avLst/>
+          </a:prstGeom>
+        </p:spPr>
+        <p:style>
+          <a:lnRef idx="2">
+            <a:schemeClr val="dk1">
+              <a:shade val="50000"/>
+            </a:schemeClr>
+          </a:lnRef>
+          <a:fillRef idx="1">
+            <a:schemeClr val="dk1"/>
+          </a:fillRef>
+          <a:effectRef idx="0">
+            <a:schemeClr val="dk1"/>
+          </a:effectRef>
+          <a:fontRef idx="minor">
+            <a:schemeClr val="lt1"/>
+          </a:fontRef>
+        </p:style>
+        <p:txBody>
+          <a:bodyPr wrap="square" rtlCol="0">
+            <a:spAutoFit/>
+          </a:bodyPr>
+          <a:lstStyle/>
+          <a:p>
+            <a:r>
+              <a:rPr lang="en-CA" sz="2400" dirty="0">
+                <a:solidFill>
+                  <a:schemeClr val="accent2"/>
+                </a:solidFill>
+              </a:rPr>
+              <a:t>31</a:t>
+            </a:r>
+            <a:endParaRPr lang="fr-FR" sz="2400" dirty="0">
+              <a:solidFill>
+                <a:schemeClr val="accent2"/>
+              </a:solidFill>
+            </a:endParaRPr>
+          </a:p>
+        </p:txBody>
+      </p:sp>
     </p:spTree>
     <p:extLst>
       <p:ext uri="{BB962C8B-B14F-4D97-AF65-F5344CB8AC3E}">
@@ -27126,7 +28330,7 @@
                 </a:spcAft>
                 <a:buNone/>
               </a:pPr>
-              <a:endParaRPr/>
+              <a:endParaRPr dirty="0"/>
             </a:p>
           </p:txBody>
         </p:sp>
@@ -27179,7 +28383,7 @@
                 </a:spcAft>
                 <a:buNone/>
               </a:pPr>
-              <a:endParaRPr/>
+              <a:endParaRPr dirty="0"/>
             </a:p>
           </p:txBody>
         </p:sp>
@@ -27275,7 +28479,7 @@
               </a:spcAft>
               <a:buNone/>
             </a:pPr>
-            <a:endParaRPr/>
+            <a:endParaRPr dirty="0"/>
           </a:p>
         </p:txBody>
       </p:sp>
@@ -27315,6 +28519,59 @@
               <a:t>EXTRAS</a:t>
             </a:r>
             <a:endParaRPr lang="fr-FR" sz="4400" dirty="0"/>
+          </a:p>
+        </p:txBody>
+      </p:sp>
+      <p:sp>
+        <p:nvSpPr>
+          <p:cNvPr id="9" name="ZoneTexte 8"/>
+          <p:cNvSpPr txBox="1"/>
+          <p:nvPr/>
+        </p:nvSpPr>
+        <p:spPr>
+          <a:xfrm>
+            <a:off x="8046721" y="435127"/>
+            <a:ext cx="687376" cy="461665"/>
+          </a:xfrm>
+          <a:prstGeom prst="rect">
+            <a:avLst/>
+          </a:prstGeom>
+        </p:spPr>
+        <p:style>
+          <a:lnRef idx="2">
+            <a:schemeClr val="dk1">
+              <a:shade val="50000"/>
+            </a:schemeClr>
+          </a:lnRef>
+          <a:fillRef idx="1">
+            <a:schemeClr val="dk1"/>
+          </a:fillRef>
+          <a:effectRef idx="0">
+            <a:schemeClr val="dk1"/>
+          </a:effectRef>
+          <a:fontRef idx="minor">
+            <a:schemeClr val="lt1"/>
+          </a:fontRef>
+        </p:style>
+        <p:txBody>
+          <a:bodyPr wrap="square" rtlCol="0">
+            <a:spAutoFit/>
+          </a:bodyPr>
+          <a:lstStyle/>
+          <a:p>
+            <a:r>
+              <a:rPr lang="en-CA" sz="2400" dirty="0">
+                <a:solidFill>
+                  <a:schemeClr val="accent2"/>
+                </a:solidFill>
+              </a:rPr>
+              <a:t>32</a:t>
+            </a:r>
+            <a:endParaRPr lang="fr-FR" sz="2400" dirty="0">
+              <a:solidFill>
+                <a:schemeClr val="accent2"/>
+              </a:solidFill>
+            </a:endParaRPr>
           </a:p>
         </p:txBody>
       </p:sp>
@@ -27403,7 +28660,7 @@
               </a:spcAft>
               <a:buNone/>
             </a:pPr>
-            <a:endParaRPr/>
+            <a:endParaRPr dirty="0"/>
           </a:p>
         </p:txBody>
       </p:sp>
@@ -27423,8 +28680,8 @@
         </p:nvSpPr>
         <p:spPr>
           <a:xfrm>
-            <a:off x="1638053" y="304688"/>
-            <a:ext cx="7186969" cy="461516"/>
+            <a:off x="1589163" y="334289"/>
+            <a:ext cx="7670985" cy="461516"/>
           </a:xfrm>
           <a:prstGeom prst="rect">
             <a:avLst/>
@@ -27691,7 +28948,7 @@
               <a:buNone/>
             </a:pPr>
             <a:r>
-              <a:rPr lang="fr-FR" sz="2400" b="1" i="0" dirty="0">
+              <a:rPr lang="fr-FR" sz="2000" i="0" dirty="0">
                 <a:effectLst/>
                 <a:latin typeface="Söhne"/>
               </a:rPr>
@@ -28037,6 +29294,59 @@
               </a:solidFill>
               <a:effectLst/>
               <a:latin typeface="Söhne"/>
+            </a:endParaRPr>
+          </a:p>
+        </p:txBody>
+      </p:sp>
+      <p:sp>
+        <p:nvSpPr>
+          <p:cNvPr id="6" name="ZoneTexte 5"/>
+          <p:cNvSpPr txBox="1"/>
+          <p:nvPr/>
+        </p:nvSpPr>
+        <p:spPr>
+          <a:xfrm>
+            <a:off x="7839936" y="435126"/>
+            <a:ext cx="687376" cy="461665"/>
+          </a:xfrm>
+          <a:prstGeom prst="rect">
+            <a:avLst/>
+          </a:prstGeom>
+        </p:spPr>
+        <p:style>
+          <a:lnRef idx="2">
+            <a:schemeClr val="dk1">
+              <a:shade val="50000"/>
+            </a:schemeClr>
+          </a:lnRef>
+          <a:fillRef idx="1">
+            <a:schemeClr val="dk1"/>
+          </a:fillRef>
+          <a:effectRef idx="0">
+            <a:schemeClr val="dk1"/>
+          </a:effectRef>
+          <a:fontRef idx="minor">
+            <a:schemeClr val="lt1"/>
+          </a:fontRef>
+        </p:style>
+        <p:txBody>
+          <a:bodyPr wrap="square" rtlCol="0">
+            <a:spAutoFit/>
+          </a:bodyPr>
+          <a:lstStyle/>
+          <a:p>
+            <a:r>
+              <a:rPr lang="en-CA" sz="2400" dirty="0">
+                <a:solidFill>
+                  <a:schemeClr val="accent2"/>
+                </a:solidFill>
+              </a:rPr>
+              <a:t>33</a:t>
+            </a:r>
+            <a:endParaRPr lang="fr-FR" sz="2400" dirty="0">
+              <a:solidFill>
+                <a:schemeClr val="accent2"/>
+              </a:solidFill>
             </a:endParaRPr>
           </a:p>
         </p:txBody>
@@ -28111,7 +29421,7 @@
             </a:pPr>
             <a:r>
               <a:rPr lang="en" dirty="0"/>
-              <a:t>Thanks!</a:t>
+              <a:t>Merci!</a:t>
             </a:r>
             <a:endParaRPr dirty="0"/>
           </a:p>
@@ -28138,25 +29448,69 @@
           </a:bodyPr>
           <a:lstStyle/>
           <a:p>
-            <a:pPr marL="0" lvl="0" indent="0" algn="ctr" rtl="0">
-              <a:spcBef>
-                <a:spcPts val="0"/>
-              </a:spcBef>
-              <a:spcAft>
-                <a:spcPts val="0"/>
-              </a:spcAft>
-              <a:buClr>
-                <a:schemeClr val="lt1"/>
-              </a:buClr>
-              <a:buSzPts val="1100"/>
-              <a:buFont typeface="Arial"/>
-              <a:buNone/>
-            </a:pPr>
             <a:r>
-              <a:rPr lang="en" dirty="0"/>
-              <a:t>Do you have any questions?</a:t>
+              <a:rPr lang="fr-FR" dirty="0"/>
+              <a:t>Si vous avez des questions ou des remarques, posez-les.?</a:t>
             </a:r>
+          </a:p>
+          <a:p>
+            <a:br>
+              <a:rPr lang="fr-FR" dirty="0"/>
+            </a:br>
             <a:endParaRPr dirty="0"/>
+          </a:p>
+        </p:txBody>
+      </p:sp>
+      <p:sp>
+        <p:nvSpPr>
+          <p:cNvPr id="4" name="ZoneTexte 3"/>
+          <p:cNvSpPr txBox="1"/>
+          <p:nvPr/>
+        </p:nvSpPr>
+        <p:spPr>
+          <a:xfrm>
+            <a:off x="8046721" y="435127"/>
+            <a:ext cx="687376" cy="461665"/>
+          </a:xfrm>
+          <a:prstGeom prst="rect">
+            <a:avLst/>
+          </a:prstGeom>
+        </p:spPr>
+        <p:style>
+          <a:lnRef idx="2">
+            <a:schemeClr val="dk1">
+              <a:shade val="50000"/>
+            </a:schemeClr>
+          </a:lnRef>
+          <a:fillRef idx="1">
+            <a:schemeClr val="dk1"/>
+          </a:fillRef>
+          <a:effectRef idx="0">
+            <a:schemeClr val="dk1"/>
+          </a:effectRef>
+          <a:fontRef idx="minor">
+            <a:schemeClr val="lt1"/>
+          </a:fontRef>
+        </p:style>
+        <p:txBody>
+          <a:bodyPr wrap="square" rtlCol="0">
+            <a:spAutoFit/>
+          </a:bodyPr>
+          <a:lstStyle/>
+          <a:p>
+            <a:r>
+              <a:rPr lang="en-CA" sz="2400" dirty="0">
+                <a:solidFill>
+                  <a:schemeClr val="accent2"/>
+                </a:solidFill>
+              </a:rPr>
+              <a:t>34</a:t>
+            </a:r>
+            <a:endParaRPr lang="fr-FR" sz="2400" dirty="0">
+              <a:solidFill>
+                <a:schemeClr val="accent2"/>
+              </a:solidFill>
+            </a:endParaRPr>
           </a:p>
         </p:txBody>
       </p:sp>
@@ -28248,7 +29602,7 @@
                 </a:spcAft>
                 <a:buNone/>
               </a:pPr>
-              <a:endParaRPr/>
+              <a:endParaRPr dirty="0"/>
             </a:p>
           </p:txBody>
         </p:sp>
@@ -28431,6 +29785,59 @@
               <a:rPr lang="fr-FR" sz="1400" dirty="0"/>
               <a:t>4. Les fichiers sont traduits en binaire (1 et 0) pour le traitement informatique.</a:t>
             </a:r>
+          </a:p>
+        </p:txBody>
+      </p:sp>
+      <p:sp>
+        <p:nvSpPr>
+          <p:cNvPr id="7" name="ZoneTexte 6"/>
+          <p:cNvSpPr txBox="1"/>
+          <p:nvPr/>
+        </p:nvSpPr>
+        <p:spPr>
+          <a:xfrm>
+            <a:off x="8620585" y="409902"/>
+            <a:ext cx="340536" cy="461665"/>
+          </a:xfrm>
+          <a:prstGeom prst="rect">
+            <a:avLst/>
+          </a:prstGeom>
+        </p:spPr>
+        <p:style>
+          <a:lnRef idx="2">
+            <a:schemeClr val="dk1">
+              <a:shade val="50000"/>
+            </a:schemeClr>
+          </a:lnRef>
+          <a:fillRef idx="1">
+            <a:schemeClr val="dk1"/>
+          </a:fillRef>
+          <a:effectRef idx="0">
+            <a:schemeClr val="dk1"/>
+          </a:effectRef>
+          <a:fontRef idx="minor">
+            <a:schemeClr val="lt1"/>
+          </a:fontRef>
+        </p:style>
+        <p:txBody>
+          <a:bodyPr wrap="square" rtlCol="0">
+            <a:spAutoFit/>
+          </a:bodyPr>
+          <a:lstStyle/>
+          <a:p>
+            <a:r>
+              <a:rPr lang="en-CA" sz="2400" dirty="0">
+                <a:solidFill>
+                  <a:schemeClr val="accent2"/>
+                </a:solidFill>
+              </a:rPr>
+              <a:t>4</a:t>
+            </a:r>
+            <a:endParaRPr lang="fr-FR" sz="2400" dirty="0">
+              <a:solidFill>
+                <a:schemeClr val="accent2"/>
+              </a:solidFill>
+            </a:endParaRPr>
           </a:p>
         </p:txBody>
       </p:sp>
@@ -28613,6 +30020,59 @@
           </a:prstGeom>
         </p:spPr>
       </p:pic>
+      <p:sp>
+        <p:nvSpPr>
+          <p:cNvPr id="5" name="ZoneTexte 4"/>
+          <p:cNvSpPr txBox="1"/>
+          <p:nvPr/>
+        </p:nvSpPr>
+        <p:spPr>
+          <a:xfrm>
+            <a:off x="8374642" y="447740"/>
+            <a:ext cx="340536" cy="461665"/>
+          </a:xfrm>
+          <a:prstGeom prst="rect">
+            <a:avLst/>
+          </a:prstGeom>
+        </p:spPr>
+        <p:style>
+          <a:lnRef idx="2">
+            <a:schemeClr val="dk1">
+              <a:shade val="50000"/>
+            </a:schemeClr>
+          </a:lnRef>
+          <a:fillRef idx="1">
+            <a:schemeClr val="dk1"/>
+          </a:fillRef>
+          <a:effectRef idx="0">
+            <a:schemeClr val="dk1"/>
+          </a:effectRef>
+          <a:fontRef idx="minor">
+            <a:schemeClr val="lt1"/>
+          </a:fontRef>
+        </p:style>
+        <p:txBody>
+          <a:bodyPr wrap="square" rtlCol="0">
+            <a:spAutoFit/>
+          </a:bodyPr>
+          <a:lstStyle/>
+          <a:p>
+            <a:r>
+              <a:rPr lang="en-CA" sz="2400" dirty="0">
+                <a:solidFill>
+                  <a:schemeClr val="accent2"/>
+                </a:solidFill>
+              </a:rPr>
+              <a:t>5</a:t>
+            </a:r>
+            <a:endParaRPr lang="fr-FR" sz="2400" dirty="0">
+              <a:solidFill>
+                <a:schemeClr val="accent2"/>
+              </a:solidFill>
+            </a:endParaRPr>
+          </a:p>
+        </p:txBody>
+      </p:sp>
     </p:spTree>
   </p:cSld>
   <p:clrMapOvr>
@@ -28869,20 +30329,7 @@
                 <a:effectLst/>
                 <a:latin typeface="Söhne Mono"/>
               </a:rPr>
-              <a:t>.</a:t>
-            </a:r>
-            <a:r>
-              <a:rPr kumimoji="0" lang="fr-FR" altLang="fr-FR" sz="1600" b="1" i="0" u="none" strike="noStrike" cap="none" normalizeH="0" baseline="0" dirty="0" err="1">
-                <a:ln>
-                  <a:noFill/>
-                </a:ln>
-                <a:solidFill>
-                  <a:srgbClr val="374151"/>
-                </a:solidFill>
-                <a:effectLst/>
-                <a:latin typeface="Söhne Mono"/>
-              </a:rPr>
-              <a:t>txt</a:t>
+              <a:t>.Txt</a:t>
             </a:r>
             <a:r>
               <a:rPr kumimoji="0" lang="fr-FR" altLang="fr-FR" b="0" i="0" u="none" strike="noStrike" cap="none" normalizeH="0" baseline="0" dirty="0">
@@ -29073,20 +30520,7 @@
                 <a:effectLst/>
                 <a:latin typeface="Söhne Mono"/>
               </a:rPr>
-              <a:t>.</a:t>
-            </a:r>
-            <a:r>
-              <a:rPr kumimoji="0" lang="fr-FR" altLang="fr-FR" sz="1600" b="1" i="0" u="none" strike="noStrike" cap="none" normalizeH="0" baseline="0" dirty="0" err="1">
-                <a:ln>
-                  <a:noFill/>
-                </a:ln>
-                <a:solidFill>
-                  <a:srgbClr val="374151"/>
-                </a:solidFill>
-                <a:effectLst/>
-                <a:latin typeface="Söhne Mono"/>
-              </a:rPr>
-              <a:t>jpg</a:t>
+              <a:t>.JPG</a:t>
             </a:r>
             <a:r>
               <a:rPr kumimoji="0" lang="fr-FR" altLang="fr-FR" b="0" i="0" u="none" strike="noStrike" cap="none" normalizeH="0" baseline="0" dirty="0">
@@ -29112,20 +30546,7 @@
                 <a:effectLst/>
                 <a:latin typeface="Söhne Mono"/>
               </a:rPr>
-              <a:t>.</a:t>
-            </a:r>
-            <a:r>
-              <a:rPr kumimoji="0" lang="fr-FR" altLang="fr-FR" sz="1600" b="1" i="0" u="none" strike="noStrike" cap="none" normalizeH="0" baseline="0" dirty="0" err="1">
-                <a:ln>
-                  <a:noFill/>
-                </a:ln>
-                <a:solidFill>
-                  <a:srgbClr val="374151"/>
-                </a:solidFill>
-                <a:effectLst/>
-                <a:latin typeface="Söhne Mono"/>
-              </a:rPr>
-              <a:t>png</a:t>
+              <a:t>.PNG</a:t>
             </a:r>
             <a:r>
               <a:rPr kumimoji="0" lang="fr-FR" altLang="fr-FR" b="0" i="0" u="none" strike="noStrike" cap="none" normalizeH="0" baseline="0" dirty="0">
@@ -29177,20 +30598,7 @@
                 <a:effectLst/>
                 <a:latin typeface="Söhne Mono"/>
               </a:rPr>
-              <a:t>.</a:t>
-            </a:r>
-            <a:r>
-              <a:rPr kumimoji="0" lang="fr-FR" altLang="fr-FR" sz="1600" b="1" i="0" u="none" strike="noStrike" cap="none" normalizeH="0" baseline="0" dirty="0" err="1">
-                <a:ln>
-                  <a:noFill/>
-                </a:ln>
-                <a:solidFill>
-                  <a:srgbClr val="374151"/>
-                </a:solidFill>
-                <a:effectLst/>
-                <a:latin typeface="Söhne Mono"/>
-              </a:rPr>
-              <a:t>exe</a:t>
+              <a:t>.Exe</a:t>
             </a:r>
             <a:r>
               <a:rPr kumimoji="0" lang="fr-FR" altLang="fr-FR" b="0" i="0" u="none" strike="noStrike" cap="none" normalizeH="0" baseline="0" dirty="0">
@@ -29234,33 +30642,7 @@
                 <a:effectLst/>
                 <a:latin typeface="Söhne"/>
               </a:rPr>
-              <a:t>Fichiers CSV (Comma-</a:t>
-            </a:r>
-            <a:r>
-              <a:rPr kumimoji="0" lang="fr-FR" altLang="fr-FR" sz="1400" b="1" i="0" u="none" strike="noStrike" cap="none" normalizeH="0" baseline="0" dirty="0" err="1">
-                <a:ln>
-                  <a:noFill/>
-                </a:ln>
-                <a:solidFill>
-                  <a:srgbClr val="374151"/>
-                </a:solidFill>
-                <a:effectLst/>
-                <a:latin typeface="Söhne"/>
-              </a:rPr>
-              <a:t>Separated</a:t>
-            </a:r>
-            <a:r>
-              <a:rPr kumimoji="0" lang="fr-FR" altLang="fr-FR" sz="1400" b="1" i="0" u="none" strike="noStrike" cap="none" normalizeH="0" baseline="0" dirty="0">
-                <a:ln>
-                  <a:noFill/>
-                </a:ln>
-                <a:solidFill>
-                  <a:srgbClr val="374151"/>
-                </a:solidFill>
-                <a:effectLst/>
-                <a:latin typeface="Söhne"/>
-              </a:rPr>
-              <a:t> Values) :</a:t>
+              <a:t>Fichiers CSV (Comma-Séparâtes Values) :</a:t>
             </a:r>
             <a:endParaRPr kumimoji="0" lang="fr-FR" altLang="fr-FR" sz="1400" b="0" i="0" u="none" strike="noStrike" cap="none" normalizeH="0" baseline="0" dirty="0">
               <a:ln>
@@ -29518,85 +30900,7 @@
                 <a:effectLst/>
                 <a:latin typeface="Söhne"/>
               </a:rPr>
-              <a:t>Fichiers XML (</a:t>
-            </a:r>
-            <a:r>
-              <a:rPr kumimoji="0" lang="fr-FR" altLang="fr-FR" sz="1400" b="1" i="0" u="none" strike="noStrike" cap="none" normalizeH="0" baseline="0" dirty="0" err="1">
-                <a:ln>
-                  <a:noFill/>
-                </a:ln>
-                <a:solidFill>
-                  <a:srgbClr val="374151"/>
-                </a:solidFill>
-                <a:effectLst/>
-                <a:latin typeface="Söhne"/>
-              </a:rPr>
-              <a:t>eXtensible</a:t>
-            </a:r>
-            <a:r>
-              <a:rPr kumimoji="0" lang="fr-FR" altLang="fr-FR" sz="1400" b="1" i="0" u="none" strike="noStrike" cap="none" normalizeH="0" baseline="0" dirty="0">
-                <a:ln>
-                  <a:noFill/>
-                </a:ln>
-                <a:solidFill>
-                  <a:srgbClr val="374151"/>
-                </a:solidFill>
-                <a:effectLst/>
-                <a:latin typeface="Söhne"/>
-              </a:rPr>
-              <a:t> </a:t>
-            </a:r>
-            <a:r>
-              <a:rPr kumimoji="0" lang="fr-FR" altLang="fr-FR" sz="1400" b="1" i="0" u="none" strike="noStrike" cap="none" normalizeH="0" baseline="0" dirty="0" err="1">
-                <a:ln>
-                  <a:noFill/>
-                </a:ln>
-                <a:solidFill>
-                  <a:srgbClr val="374151"/>
-                </a:solidFill>
-                <a:effectLst/>
-                <a:latin typeface="Söhne"/>
-              </a:rPr>
-              <a:t>Markup</a:t>
-            </a:r>
-            <a:r>
-              <a:rPr kumimoji="0" lang="fr-FR" altLang="fr-FR" sz="1400" b="1" i="0" u="none" strike="noStrike" cap="none" normalizeH="0" baseline="0" dirty="0">
-                <a:ln>
-                  <a:noFill/>
-                </a:ln>
-                <a:solidFill>
-                  <a:srgbClr val="374151"/>
-                </a:solidFill>
-                <a:effectLst/>
-                <a:latin typeface="Söhne"/>
-              </a:rPr>
-              <a:t> </a:t>
-            </a:r>
-            <a:r>
-              <a:rPr kumimoji="0" lang="fr-FR" altLang="fr-FR" sz="1400" b="1" i="0" u="none" strike="noStrike" cap="none" normalizeH="0" baseline="0" dirty="0" err="1">
-                <a:ln>
-                  <a:noFill/>
-                </a:ln>
-                <a:solidFill>
-                  <a:srgbClr val="374151"/>
-                </a:solidFill>
-                <a:effectLst/>
-                <a:latin typeface="Söhne"/>
-              </a:rPr>
-              <a:t>Language</a:t>
-            </a:r>
-            <a:r>
-              <a:rPr kumimoji="0" lang="fr-FR" altLang="fr-FR" sz="1400" b="1" i="0" u="none" strike="noStrike" cap="none" normalizeH="0" baseline="0" dirty="0">
-                <a:ln>
-                  <a:noFill/>
-                </a:ln>
-                <a:solidFill>
-                  <a:srgbClr val="374151"/>
-                </a:solidFill>
-                <a:effectLst/>
-                <a:latin typeface="Söhne"/>
-              </a:rPr>
-              <a:t>) :</a:t>
+              <a:t>Fichiers XML (extensible Markus Langage) :</a:t>
             </a:r>
             <a:endParaRPr kumimoji="0" lang="fr-FR" altLang="fr-FR" sz="1400" b="0" i="0" u="none" strike="noStrike" cap="none" normalizeH="0" baseline="0" dirty="0">
               <a:ln>
@@ -29904,6 +31208,59 @@
           </a:extLst>
         </p:spPr>
       </p:pic>
+      <p:sp>
+        <p:nvSpPr>
+          <p:cNvPr id="9" name="ZoneTexte 8"/>
+          <p:cNvSpPr txBox="1"/>
+          <p:nvPr/>
+        </p:nvSpPr>
+        <p:spPr>
+          <a:xfrm>
+            <a:off x="8424025" y="454046"/>
+            <a:ext cx="340536" cy="461665"/>
+          </a:xfrm>
+          <a:prstGeom prst="rect">
+            <a:avLst/>
+          </a:prstGeom>
+        </p:spPr>
+        <p:style>
+          <a:lnRef idx="2">
+            <a:schemeClr val="dk1">
+              <a:shade val="50000"/>
+            </a:schemeClr>
+          </a:lnRef>
+          <a:fillRef idx="1">
+            <a:schemeClr val="dk1"/>
+          </a:fillRef>
+          <a:effectRef idx="0">
+            <a:schemeClr val="dk1"/>
+          </a:effectRef>
+          <a:fontRef idx="minor">
+            <a:schemeClr val="lt1"/>
+          </a:fontRef>
+        </p:style>
+        <p:txBody>
+          <a:bodyPr wrap="square" rtlCol="0">
+            <a:spAutoFit/>
+          </a:bodyPr>
+          <a:lstStyle/>
+          <a:p>
+            <a:r>
+              <a:rPr lang="en-CA" sz="2400" dirty="0">
+                <a:solidFill>
+                  <a:schemeClr val="accent2"/>
+                </a:solidFill>
+              </a:rPr>
+              <a:t>6</a:t>
+            </a:r>
+            <a:endParaRPr lang="fr-FR" sz="2400" dirty="0">
+              <a:solidFill>
+                <a:schemeClr val="accent2"/>
+              </a:solidFill>
+            </a:endParaRPr>
+          </a:p>
+        </p:txBody>
+      </p:sp>
     </p:spTree>
     <p:extLst>
       <p:ext uri="{BB962C8B-B14F-4D97-AF65-F5344CB8AC3E}">
@@ -30032,7 +31389,7 @@
                 </a:spcAft>
                 <a:buNone/>
               </a:pPr>
-              <a:endParaRPr/>
+              <a:endParaRPr dirty="0"/>
             </a:p>
           </p:txBody>
         </p:sp>
@@ -30085,7 +31442,7 @@
                 </a:spcAft>
                 <a:buNone/>
               </a:pPr>
-              <a:endParaRPr/>
+              <a:endParaRPr dirty="0"/>
             </a:p>
           </p:txBody>
         </p:sp>
@@ -30181,7 +31538,7 @@
               </a:spcAft>
               <a:buNone/>
             </a:pPr>
-            <a:endParaRPr/>
+            <a:endParaRPr dirty="0"/>
           </a:p>
         </p:txBody>
       </p:sp>
@@ -30221,6 +31578,59 @@
               <a:t>Comprendre les Chemins de Fichiers</a:t>
             </a:r>
             <a:endParaRPr lang="fr-FR" sz="2400" dirty="0"/>
+          </a:p>
+        </p:txBody>
+      </p:sp>
+      <p:sp>
+        <p:nvSpPr>
+          <p:cNvPr id="9" name="ZoneTexte 8"/>
+          <p:cNvSpPr txBox="1"/>
+          <p:nvPr/>
+        </p:nvSpPr>
+        <p:spPr>
+          <a:xfrm>
+            <a:off x="8652115" y="447740"/>
+            <a:ext cx="340536" cy="461665"/>
+          </a:xfrm>
+          <a:prstGeom prst="rect">
+            <a:avLst/>
+          </a:prstGeom>
+        </p:spPr>
+        <p:style>
+          <a:lnRef idx="2">
+            <a:schemeClr val="dk1">
+              <a:shade val="50000"/>
+            </a:schemeClr>
+          </a:lnRef>
+          <a:fillRef idx="1">
+            <a:schemeClr val="dk1"/>
+          </a:fillRef>
+          <a:effectRef idx="0">
+            <a:schemeClr val="dk1"/>
+          </a:effectRef>
+          <a:fontRef idx="minor">
+            <a:schemeClr val="lt1"/>
+          </a:fontRef>
+        </p:style>
+        <p:txBody>
+          <a:bodyPr wrap="square" rtlCol="0">
+            <a:spAutoFit/>
+          </a:bodyPr>
+          <a:lstStyle/>
+          <a:p>
+            <a:r>
+              <a:rPr lang="en-CA" sz="2400" dirty="0">
+                <a:solidFill>
+                  <a:schemeClr val="accent2"/>
+                </a:solidFill>
+              </a:rPr>
+              <a:t>7</a:t>
+            </a:r>
+            <a:endParaRPr lang="fr-FR" sz="2400" dirty="0">
+              <a:solidFill>
+                <a:schemeClr val="accent2"/>
+              </a:solidFill>
+            </a:endParaRPr>
           </a:p>
         </p:txBody>
       </p:sp>
@@ -30317,7 +31727,7 @@
                 </a:spcAft>
                 <a:buNone/>
               </a:pPr>
-              <a:endParaRPr/>
+              <a:endParaRPr dirty="0"/>
             </a:p>
           </p:txBody>
         </p:sp>
@@ -30370,7 +31780,7 @@
                 </a:spcAft>
                 <a:buNone/>
               </a:pPr>
-              <a:endParaRPr/>
+              <a:endParaRPr dirty="0"/>
             </a:p>
           </p:txBody>
         </p:sp>
@@ -30457,6 +31867,59 @@
               <a:t>Un chemin de fichier est une chaîne de caractères représentant l'emplacement d'un fichier.</a:t>
             </a:r>
             <a:endParaRPr sz="2000" dirty="0"/>
+          </a:p>
+        </p:txBody>
+      </p:sp>
+      <p:sp>
+        <p:nvSpPr>
+          <p:cNvPr id="7" name="ZoneTexte 6"/>
+          <p:cNvSpPr txBox="1"/>
+          <p:nvPr/>
+        </p:nvSpPr>
+        <p:spPr>
+          <a:xfrm>
+            <a:off x="8626891" y="441433"/>
+            <a:ext cx="340536" cy="461665"/>
+          </a:xfrm>
+          <a:prstGeom prst="rect">
+            <a:avLst/>
+          </a:prstGeom>
+        </p:spPr>
+        <p:style>
+          <a:lnRef idx="2">
+            <a:schemeClr val="dk1">
+              <a:shade val="50000"/>
+            </a:schemeClr>
+          </a:lnRef>
+          <a:fillRef idx="1">
+            <a:schemeClr val="dk1"/>
+          </a:fillRef>
+          <a:effectRef idx="0">
+            <a:schemeClr val="dk1"/>
+          </a:effectRef>
+          <a:fontRef idx="minor">
+            <a:schemeClr val="lt1"/>
+          </a:fontRef>
+        </p:style>
+        <p:txBody>
+          <a:bodyPr wrap="square" rtlCol="0">
+            <a:spAutoFit/>
+          </a:bodyPr>
+          <a:lstStyle/>
+          <a:p>
+            <a:r>
+              <a:rPr lang="en-CA" sz="2400" dirty="0">
+                <a:solidFill>
+                  <a:schemeClr val="accent2"/>
+                </a:solidFill>
+              </a:rPr>
+              <a:t>8</a:t>
+            </a:r>
+            <a:endParaRPr lang="fr-FR" sz="2400" dirty="0">
+              <a:solidFill>
+                <a:schemeClr val="accent2"/>
+              </a:solidFill>
+            </a:endParaRPr>
           </a:p>
         </p:txBody>
       </p:sp>
@@ -30553,7 +32016,7 @@
                 </a:spcAft>
                 <a:buNone/>
               </a:pPr>
-              <a:endParaRPr/>
+              <a:endParaRPr dirty="0"/>
             </a:p>
           </p:txBody>
         </p:sp>
@@ -30606,7 +32069,7 @@
                 </a:spcAft>
                 <a:buNone/>
               </a:pPr>
-              <a:endParaRPr/>
+              <a:endParaRPr dirty="0"/>
             </a:p>
           </p:txBody>
         </p:sp>
@@ -30734,6 +32197,59 @@
               <a:buChar char="•"/>
             </a:pPr>
             <a:endParaRPr lang="fr-FR" sz="1800" i="1" dirty="0"/>
+          </a:p>
+        </p:txBody>
+      </p:sp>
+      <p:sp>
+        <p:nvSpPr>
+          <p:cNvPr id="7" name="ZoneTexte 6"/>
+          <p:cNvSpPr txBox="1"/>
+          <p:nvPr/>
+        </p:nvSpPr>
+        <p:spPr>
+          <a:xfrm>
+            <a:off x="8645809" y="460352"/>
+            <a:ext cx="340536" cy="461665"/>
+          </a:xfrm>
+          <a:prstGeom prst="rect">
+            <a:avLst/>
+          </a:prstGeom>
+        </p:spPr>
+        <p:style>
+          <a:lnRef idx="2">
+            <a:schemeClr val="dk1">
+              <a:shade val="50000"/>
+            </a:schemeClr>
+          </a:lnRef>
+          <a:fillRef idx="1">
+            <a:schemeClr val="dk1"/>
+          </a:fillRef>
+          <a:effectRef idx="0">
+            <a:schemeClr val="dk1"/>
+          </a:effectRef>
+          <a:fontRef idx="minor">
+            <a:schemeClr val="lt1"/>
+          </a:fontRef>
+        </p:style>
+        <p:txBody>
+          <a:bodyPr wrap="square" rtlCol="0">
+            <a:spAutoFit/>
+          </a:bodyPr>
+          <a:lstStyle/>
+          <a:p>
+            <a:r>
+              <a:rPr lang="en-CA" sz="2400" dirty="0">
+                <a:solidFill>
+                  <a:schemeClr val="accent2"/>
+                </a:solidFill>
+              </a:rPr>
+              <a:t>9</a:t>
+            </a:r>
+            <a:endParaRPr lang="fr-FR" sz="2400" dirty="0">
+              <a:solidFill>
+                <a:schemeClr val="accent2"/>
+              </a:solidFill>
+            </a:endParaRPr>
           </a:p>
         </p:txBody>
       </p:sp>
@@ -31355,7 +32871,7 @@
     </a:clrScheme>
     <a:fontScheme name="Office">
       <a:majorFont>
-        <a:latin typeface="Calibri Light" panose="020F0302020204030204"/>
+        <a:latin typeface="Calibri Light"/>
         <a:ea typeface=""/>
         <a:cs typeface=""/>
         <a:font script="Jpan" typeface="游ゴシック Light"/>
@@ -31407,7 +32923,7 @@
         <a:font script="Tfng" typeface="Ebrima"/>
       </a:majorFont>
       <a:minorFont>
-        <a:latin typeface="Calibri" panose="020F0502020204030204"/>
+        <a:latin typeface="Calibri"/>
         <a:ea typeface=""/>
         <a:cs typeface=""/>
         <a:font script="Jpan" typeface="游ゴシック"/>

</xml_diff>